<commit_message>
After B04 (design by contract) lecture
</commit_message>
<xml_diff>
--- a/Lecture slides/ADAP B02 - Class and Interface Design.pptx
+++ b/Lecture slides/ADAP B02 - Class and Interface Design.pptx
@@ -58,6 +58,7 @@
     <p:sldId id="303" r:id="rId53"/>
     <p:sldId id="304" r:id="rId54"/>
     <p:sldId id="305" r:id="rId55"/>
+    <p:sldId id="306" r:id="rId56"/>
   </p:sldIdLst>
   <p:sldSz cy="5143500" cx="9144000"/>
   <p:notesSz cx="6858000" cy="9144000"/>
@@ -2833,7 +2834,7 @@
       </p:grpSpPr>
       <p:sp>
         <p:nvSpPr>
-          <p:cNvPr id="234" name="Google Shape;234;g302caffcd6e_0_6:notes"/>
+          <p:cNvPr id="234" name="Google Shape;234;g399feb6e257_0_0:notes"/>
           <p:cNvSpPr/>
           <p:nvPr>
             <p:ph idx="2" type="sldImg"/>
@@ -2868,7 +2869,7 @@
       </p:sp>
       <p:sp>
         <p:nvSpPr>
-          <p:cNvPr id="235" name="Google Shape;235;g302caffcd6e_0_6:notes"/>
+          <p:cNvPr id="235" name="Google Shape;235;g399feb6e257_0_0:notes"/>
           <p:cNvSpPr txBox="1"/>
           <p:nvPr>
             <p:ph idx="1" type="body"/>
@@ -3017,7 +3018,7 @@
   <p:cSld>
     <p:spTree>
       <p:nvGrpSpPr>
-        <p:cNvPr id="240" name="Shape 240"/>
+        <p:cNvPr id="241" name="Shape 241"/>
         <p:cNvGrpSpPr/>
         <p:nvPr/>
       </p:nvGrpSpPr>
@@ -3031,7 +3032,7 @@
       </p:grpSpPr>
       <p:sp>
         <p:nvSpPr>
-          <p:cNvPr id="241" name="Google Shape;241;g313cc4519ca_0_0:notes"/>
+          <p:cNvPr id="242" name="Google Shape;242;g302caffcd6e_0_6:notes"/>
           <p:cNvSpPr/>
           <p:nvPr>
             <p:ph idx="2" type="sldImg"/>
@@ -3066,7 +3067,7 @@
       </p:sp>
       <p:sp>
         <p:nvSpPr>
-          <p:cNvPr id="242" name="Google Shape;242;g313cc4519ca_0_0:notes"/>
+          <p:cNvPr id="243" name="Google Shape;243;g302caffcd6e_0_6:notes"/>
           <p:cNvSpPr txBox="1"/>
           <p:nvPr>
             <p:ph idx="1" type="body"/>
@@ -3116,7 +3117,7 @@
   <p:cSld>
     <p:spTree>
       <p:nvGrpSpPr>
-        <p:cNvPr id="247" name="Shape 247"/>
+        <p:cNvPr id="248" name="Shape 248"/>
         <p:cNvGrpSpPr/>
         <p:nvPr/>
       </p:nvGrpSpPr>
@@ -3130,7 +3131,7 @@
       </p:grpSpPr>
       <p:sp>
         <p:nvSpPr>
-          <p:cNvPr id="248" name="Google Shape;248;g30304b9c80a_1_13:notes"/>
+          <p:cNvPr id="249" name="Google Shape;249;g313cc4519ca_0_0:notes"/>
           <p:cNvSpPr/>
           <p:nvPr>
             <p:ph idx="2" type="sldImg"/>
@@ -3165,7 +3166,7 @@
       </p:sp>
       <p:sp>
         <p:nvSpPr>
-          <p:cNvPr id="249" name="Google Shape;249;g30304b9c80a_1_13:notes"/>
+          <p:cNvPr id="250" name="Google Shape;250;g313cc4519ca_0_0:notes"/>
           <p:cNvSpPr txBox="1"/>
           <p:nvPr>
             <p:ph idx="1" type="body"/>
@@ -3215,7 +3216,7 @@
   <p:cSld>
     <p:spTree>
       <p:nvGrpSpPr>
-        <p:cNvPr id="252" name="Shape 252"/>
+        <p:cNvPr id="255" name="Shape 255"/>
         <p:cNvGrpSpPr/>
         <p:nvPr/>
       </p:nvGrpSpPr>
@@ -3229,7 +3230,7 @@
       </p:grpSpPr>
       <p:sp>
         <p:nvSpPr>
-          <p:cNvPr id="253" name="Google Shape;253;g30304b9c80a_1_17:notes"/>
+          <p:cNvPr id="256" name="Google Shape;256;g30304b9c80a_1_13:notes"/>
           <p:cNvSpPr/>
           <p:nvPr>
             <p:ph idx="2" type="sldImg"/>
@@ -3264,7 +3265,7 @@
       </p:sp>
       <p:sp>
         <p:nvSpPr>
-          <p:cNvPr id="254" name="Google Shape;254;g30304b9c80a_1_17:notes"/>
+          <p:cNvPr id="257" name="Google Shape;257;g30304b9c80a_1_13:notes"/>
           <p:cNvSpPr txBox="1"/>
           <p:nvPr>
             <p:ph idx="1" type="body"/>
@@ -3314,7 +3315,7 @@
   <p:cSld>
     <p:spTree>
       <p:nvGrpSpPr>
-        <p:cNvPr id="259" name="Shape 259"/>
+        <p:cNvPr id="260" name="Shape 260"/>
         <p:cNvGrpSpPr/>
         <p:nvPr/>
       </p:nvGrpSpPr>
@@ -3328,7 +3329,7 @@
       </p:grpSpPr>
       <p:sp>
         <p:nvSpPr>
-          <p:cNvPr id="260" name="Google Shape;260;g397f86edc0a_1_0:notes"/>
+          <p:cNvPr id="261" name="Google Shape;261;g30304b9c80a_1_17:notes"/>
           <p:cNvSpPr/>
           <p:nvPr>
             <p:ph idx="2" type="sldImg"/>
@@ -3363,7 +3364,7 @@
       </p:sp>
       <p:sp>
         <p:nvSpPr>
-          <p:cNvPr id="261" name="Google Shape;261;g397f86edc0a_1_0:notes"/>
+          <p:cNvPr id="262" name="Google Shape;262;g30304b9c80a_1_17:notes"/>
           <p:cNvSpPr txBox="1"/>
           <p:nvPr>
             <p:ph idx="1" type="body"/>
@@ -3413,7 +3414,7 @@
   <p:cSld>
     <p:spTree>
       <p:nvGrpSpPr>
-        <p:cNvPr id="266" name="Shape 266"/>
+        <p:cNvPr id="267" name="Shape 267"/>
         <p:cNvGrpSpPr/>
         <p:nvPr/>
       </p:nvGrpSpPr>
@@ -3427,7 +3428,7 @@
       </p:grpSpPr>
       <p:sp>
         <p:nvSpPr>
-          <p:cNvPr id="267" name="Google Shape;267;g30304b9c80a_1_23:notes"/>
+          <p:cNvPr id="268" name="Google Shape;268;g397f86edc0a_1_0:notes"/>
           <p:cNvSpPr/>
           <p:nvPr>
             <p:ph idx="2" type="sldImg"/>
@@ -3462,7 +3463,7 @@
       </p:sp>
       <p:sp>
         <p:nvSpPr>
-          <p:cNvPr id="268" name="Google Shape;268;g30304b9c80a_1_23:notes"/>
+          <p:cNvPr id="269" name="Google Shape;269;g397f86edc0a_1_0:notes"/>
           <p:cNvSpPr txBox="1"/>
           <p:nvPr>
             <p:ph idx="1" type="body"/>
@@ -3512,7 +3513,7 @@
   <p:cSld>
     <p:spTree>
       <p:nvGrpSpPr>
-        <p:cNvPr id="273" name="Shape 273"/>
+        <p:cNvPr id="274" name="Shape 274"/>
         <p:cNvGrpSpPr/>
         <p:nvPr/>
       </p:nvGrpSpPr>
@@ -3526,7 +3527,7 @@
       </p:grpSpPr>
       <p:sp>
         <p:nvSpPr>
-          <p:cNvPr id="274" name="Google Shape;274;g30304b9c80a_1_29:notes"/>
+          <p:cNvPr id="275" name="Google Shape;275;g30304b9c80a_1_23:notes"/>
           <p:cNvSpPr/>
           <p:nvPr>
             <p:ph idx="2" type="sldImg"/>
@@ -3561,7 +3562,7 @@
       </p:sp>
       <p:sp>
         <p:nvSpPr>
-          <p:cNvPr id="275" name="Google Shape;275;g30304b9c80a_1_29:notes"/>
+          <p:cNvPr id="276" name="Google Shape;276;g30304b9c80a_1_23:notes"/>
           <p:cNvSpPr txBox="1"/>
           <p:nvPr>
             <p:ph idx="1" type="body"/>
@@ -3611,7 +3612,7 @@
   <p:cSld>
     <p:spTree>
       <p:nvGrpSpPr>
-        <p:cNvPr id="280" name="Shape 280"/>
+        <p:cNvPr id="281" name="Shape 281"/>
         <p:cNvGrpSpPr/>
         <p:nvPr/>
       </p:nvGrpSpPr>
@@ -3625,7 +3626,7 @@
       </p:grpSpPr>
       <p:sp>
         <p:nvSpPr>
-          <p:cNvPr id="281" name="Google Shape;281;g30304b9c80a_1_37:notes"/>
+          <p:cNvPr id="282" name="Google Shape;282;g30304b9c80a_1_29:notes"/>
           <p:cNvSpPr/>
           <p:nvPr>
             <p:ph idx="2" type="sldImg"/>
@@ -3660,7 +3661,7 @@
       </p:sp>
       <p:sp>
         <p:nvSpPr>
-          <p:cNvPr id="282" name="Google Shape;282;g30304b9c80a_1_37:notes"/>
+          <p:cNvPr id="283" name="Google Shape;283;g30304b9c80a_1_29:notes"/>
           <p:cNvSpPr txBox="1"/>
           <p:nvPr>
             <p:ph idx="1" type="body"/>
@@ -3710,7 +3711,7 @@
   <p:cSld>
     <p:spTree>
       <p:nvGrpSpPr>
-        <p:cNvPr id="287" name="Shape 287"/>
+        <p:cNvPr id="288" name="Shape 288"/>
         <p:cNvGrpSpPr/>
         <p:nvPr/>
       </p:nvGrpSpPr>
@@ -3724,7 +3725,7 @@
       </p:grpSpPr>
       <p:sp>
         <p:nvSpPr>
-          <p:cNvPr id="288" name="Google Shape;288;g30304b9c80a_1_43:notes"/>
+          <p:cNvPr id="289" name="Google Shape;289;g30304b9c80a_1_37:notes"/>
           <p:cNvSpPr/>
           <p:nvPr>
             <p:ph idx="2" type="sldImg"/>
@@ -3759,7 +3760,7 @@
       </p:sp>
       <p:sp>
         <p:nvSpPr>
-          <p:cNvPr id="289" name="Google Shape;289;g30304b9c80a_1_43:notes"/>
+          <p:cNvPr id="290" name="Google Shape;290;g30304b9c80a_1_37:notes"/>
           <p:cNvSpPr txBox="1"/>
           <p:nvPr>
             <p:ph idx="1" type="body"/>
@@ -3809,7 +3810,7 @@
   <p:cSld>
     <p:spTree>
       <p:nvGrpSpPr>
-        <p:cNvPr id="294" name="Shape 294"/>
+        <p:cNvPr id="295" name="Shape 295"/>
         <p:cNvGrpSpPr/>
         <p:nvPr/>
       </p:nvGrpSpPr>
@@ -3823,7 +3824,7 @@
       </p:grpSpPr>
       <p:sp>
         <p:nvSpPr>
-          <p:cNvPr id="295" name="Google Shape;295;g30304b9c80a_1_49:notes"/>
+          <p:cNvPr id="296" name="Google Shape;296;g30304b9c80a_1_43:notes"/>
           <p:cNvSpPr/>
           <p:nvPr>
             <p:ph idx="2" type="sldImg"/>
@@ -3858,7 +3859,7 @@
       </p:sp>
       <p:sp>
         <p:nvSpPr>
-          <p:cNvPr id="296" name="Google Shape;296;g30304b9c80a_1_49:notes"/>
+          <p:cNvPr id="297" name="Google Shape;297;g30304b9c80a_1_43:notes"/>
           <p:cNvSpPr txBox="1"/>
           <p:nvPr>
             <p:ph idx="1" type="body"/>
@@ -3908,7 +3909,7 @@
   <p:cSld>
     <p:spTree>
       <p:nvGrpSpPr>
-        <p:cNvPr id="301" name="Shape 301"/>
+        <p:cNvPr id="302" name="Shape 302"/>
         <p:cNvGrpSpPr/>
         <p:nvPr/>
       </p:nvGrpSpPr>
@@ -3922,7 +3923,7 @@
       </p:grpSpPr>
       <p:sp>
         <p:nvSpPr>
-          <p:cNvPr id="302" name="Google Shape;302;g30304b9c80a_1_55:notes"/>
+          <p:cNvPr id="303" name="Google Shape;303;g30304b9c80a_1_49:notes"/>
           <p:cNvSpPr/>
           <p:nvPr>
             <p:ph idx="2" type="sldImg"/>
@@ -3957,7 +3958,7 @@
       </p:sp>
       <p:sp>
         <p:nvSpPr>
-          <p:cNvPr id="303" name="Google Shape;303;g30304b9c80a_1_55:notes"/>
+          <p:cNvPr id="304" name="Google Shape;304;g30304b9c80a_1_49:notes"/>
           <p:cNvSpPr txBox="1"/>
           <p:nvPr>
             <p:ph idx="1" type="body"/>
@@ -4106,7 +4107,7 @@
   <p:cSld>
     <p:spTree>
       <p:nvGrpSpPr>
-        <p:cNvPr id="308" name="Shape 308"/>
+        <p:cNvPr id="309" name="Shape 309"/>
         <p:cNvGrpSpPr/>
         <p:nvPr/>
       </p:nvGrpSpPr>
@@ -4120,7 +4121,7 @@
       </p:grpSpPr>
       <p:sp>
         <p:nvSpPr>
-          <p:cNvPr id="309" name="Google Shape;309;g30304b9c80a_1_7:notes"/>
+          <p:cNvPr id="310" name="Google Shape;310;g30304b9c80a_1_55:notes"/>
           <p:cNvSpPr/>
           <p:nvPr>
             <p:ph idx="2" type="sldImg"/>
@@ -4155,7 +4156,7 @@
       </p:sp>
       <p:sp>
         <p:nvSpPr>
-          <p:cNvPr id="310" name="Google Shape;310;g30304b9c80a_1_7:notes"/>
+          <p:cNvPr id="311" name="Google Shape;311;g30304b9c80a_1_55:notes"/>
           <p:cNvSpPr txBox="1"/>
           <p:nvPr>
             <p:ph idx="1" type="body"/>
@@ -4205,7 +4206,7 @@
   <p:cSld>
     <p:spTree>
       <p:nvGrpSpPr>
-        <p:cNvPr id="313" name="Shape 313"/>
+        <p:cNvPr id="316" name="Shape 316"/>
         <p:cNvGrpSpPr/>
         <p:nvPr/>
       </p:nvGrpSpPr>
@@ -4219,7 +4220,7 @@
       </p:grpSpPr>
       <p:sp>
         <p:nvSpPr>
-          <p:cNvPr id="314" name="Google Shape;314;g30304b9c80a_1_61:notes"/>
+          <p:cNvPr id="317" name="Google Shape;317;g30304b9c80a_1_7:notes"/>
           <p:cNvSpPr/>
           <p:nvPr>
             <p:ph idx="2" type="sldImg"/>
@@ -4254,7 +4255,7 @@
       </p:sp>
       <p:sp>
         <p:nvSpPr>
-          <p:cNvPr id="315" name="Google Shape;315;g30304b9c80a_1_61:notes"/>
+          <p:cNvPr id="318" name="Google Shape;318;g30304b9c80a_1_7:notes"/>
           <p:cNvSpPr txBox="1"/>
           <p:nvPr>
             <p:ph idx="1" type="body"/>
@@ -4304,7 +4305,7 @@
   <p:cSld>
     <p:spTree>
       <p:nvGrpSpPr>
-        <p:cNvPr id="320" name="Shape 320"/>
+        <p:cNvPr id="321" name="Shape 321"/>
         <p:cNvGrpSpPr/>
         <p:nvPr/>
       </p:nvGrpSpPr>
@@ -4318,7 +4319,7 @@
       </p:grpSpPr>
       <p:sp>
         <p:nvSpPr>
-          <p:cNvPr id="321" name="Google Shape;321;g30304b9c80a_1_73:notes"/>
+          <p:cNvPr id="322" name="Google Shape;322;g30304b9c80a_1_61:notes"/>
           <p:cNvSpPr/>
           <p:nvPr>
             <p:ph idx="2" type="sldImg"/>
@@ -4353,7 +4354,7 @@
       </p:sp>
       <p:sp>
         <p:nvSpPr>
-          <p:cNvPr id="322" name="Google Shape;322;g30304b9c80a_1_73:notes"/>
+          <p:cNvPr id="323" name="Google Shape;323;g30304b9c80a_1_61:notes"/>
           <p:cNvSpPr txBox="1"/>
           <p:nvPr>
             <p:ph idx="1" type="body"/>
@@ -4403,7 +4404,7 @@
   <p:cSld>
     <p:spTree>
       <p:nvGrpSpPr>
-        <p:cNvPr id="327" name="Shape 327"/>
+        <p:cNvPr id="328" name="Shape 328"/>
         <p:cNvGrpSpPr/>
         <p:nvPr/>
       </p:nvGrpSpPr>
@@ -4417,7 +4418,7 @@
       </p:grpSpPr>
       <p:sp>
         <p:nvSpPr>
-          <p:cNvPr id="328" name="Google Shape;328;g30304b9c80a_1_79:notes"/>
+          <p:cNvPr id="329" name="Google Shape;329;g30304b9c80a_1_73:notes"/>
           <p:cNvSpPr/>
           <p:nvPr>
             <p:ph idx="2" type="sldImg"/>
@@ -4452,7 +4453,7 @@
       </p:sp>
       <p:sp>
         <p:nvSpPr>
-          <p:cNvPr id="329" name="Google Shape;329;g30304b9c80a_1_79:notes"/>
+          <p:cNvPr id="330" name="Google Shape;330;g30304b9c80a_1_73:notes"/>
           <p:cNvSpPr txBox="1"/>
           <p:nvPr>
             <p:ph idx="1" type="body"/>
@@ -4502,7 +4503,7 @@
   <p:cSld>
     <p:spTree>
       <p:nvGrpSpPr>
-        <p:cNvPr id="334" name="Shape 334"/>
+        <p:cNvPr id="335" name="Shape 335"/>
         <p:cNvGrpSpPr/>
         <p:nvPr/>
       </p:nvGrpSpPr>
@@ -4516,7 +4517,7 @@
       </p:grpSpPr>
       <p:sp>
         <p:nvSpPr>
-          <p:cNvPr id="335" name="Google Shape;335;g30304b9c80a_1_85:notes"/>
+          <p:cNvPr id="336" name="Google Shape;336;g30304b9c80a_1_79:notes"/>
           <p:cNvSpPr/>
           <p:nvPr>
             <p:ph idx="2" type="sldImg"/>
@@ -4551,7 +4552,7 @@
       </p:sp>
       <p:sp>
         <p:nvSpPr>
-          <p:cNvPr id="336" name="Google Shape;336;g30304b9c80a_1_85:notes"/>
+          <p:cNvPr id="337" name="Google Shape;337;g30304b9c80a_1_79:notes"/>
           <p:cNvSpPr txBox="1"/>
           <p:nvPr>
             <p:ph idx="1" type="body"/>
@@ -4601,7 +4602,7 @@
   <p:cSld>
     <p:spTree>
       <p:nvGrpSpPr>
-        <p:cNvPr id="341" name="Shape 341"/>
+        <p:cNvPr id="342" name="Shape 342"/>
         <p:cNvGrpSpPr/>
         <p:nvPr/>
       </p:nvGrpSpPr>
@@ -4615,7 +4616,7 @@
       </p:grpSpPr>
       <p:sp>
         <p:nvSpPr>
-          <p:cNvPr id="342" name="Google Shape;342;g30304b9c80a_1_91:notes"/>
+          <p:cNvPr id="343" name="Google Shape;343;g30304b9c80a_1_85:notes"/>
           <p:cNvSpPr/>
           <p:nvPr>
             <p:ph idx="2" type="sldImg"/>
@@ -4650,7 +4651,7 @@
       </p:sp>
       <p:sp>
         <p:nvSpPr>
-          <p:cNvPr id="343" name="Google Shape;343;g30304b9c80a_1_91:notes"/>
+          <p:cNvPr id="344" name="Google Shape;344;g30304b9c80a_1_85:notes"/>
           <p:cNvSpPr txBox="1"/>
           <p:nvPr>
             <p:ph idx="1" type="body"/>
@@ -4700,7 +4701,7 @@
   <p:cSld>
     <p:spTree>
       <p:nvGrpSpPr>
-        <p:cNvPr id="348" name="Shape 348"/>
+        <p:cNvPr id="349" name="Shape 349"/>
         <p:cNvGrpSpPr/>
         <p:nvPr/>
       </p:nvGrpSpPr>
@@ -4714,7 +4715,7 @@
       </p:grpSpPr>
       <p:sp>
         <p:nvSpPr>
-          <p:cNvPr id="349" name="Google Shape;349;g30465d2178b_0_0:notes"/>
+          <p:cNvPr id="350" name="Google Shape;350;g30304b9c80a_1_91:notes"/>
           <p:cNvSpPr/>
           <p:nvPr>
             <p:ph idx="2" type="sldImg"/>
@@ -4749,7 +4750,7 @@
       </p:sp>
       <p:sp>
         <p:nvSpPr>
-          <p:cNvPr id="350" name="Google Shape;350;g30465d2178b_0_0:notes"/>
+          <p:cNvPr id="351" name="Google Shape;351;g30304b9c80a_1_91:notes"/>
           <p:cNvSpPr txBox="1"/>
           <p:nvPr>
             <p:ph idx="1" type="body"/>
@@ -4799,7 +4800,7 @@
   <p:cSld>
     <p:spTree>
       <p:nvGrpSpPr>
-        <p:cNvPr id="357" name="Shape 357"/>
+        <p:cNvPr id="356" name="Shape 356"/>
         <p:cNvGrpSpPr/>
         <p:nvPr/>
       </p:nvGrpSpPr>
@@ -4813,7 +4814,7 @@
       </p:grpSpPr>
       <p:sp>
         <p:nvSpPr>
-          <p:cNvPr id="358" name="Google Shape;358;g2d40b766212_1_1:notes"/>
+          <p:cNvPr id="357" name="Google Shape;357;g30465d2178b_0_0:notes"/>
           <p:cNvSpPr/>
           <p:nvPr>
             <p:ph idx="2" type="sldImg"/>
@@ -4848,7 +4849,7 @@
       </p:sp>
       <p:sp>
         <p:nvSpPr>
-          <p:cNvPr id="359" name="Google Shape;359;g2d40b766212_1_1:notes"/>
+          <p:cNvPr id="358" name="Google Shape;358;g30465d2178b_0_0:notes"/>
           <p:cNvSpPr txBox="1"/>
           <p:nvPr>
             <p:ph idx="1" type="body"/>
@@ -4898,7 +4899,7 @@
   <p:cSld>
     <p:spTree>
       <p:nvGrpSpPr>
-        <p:cNvPr id="364" name="Shape 364"/>
+        <p:cNvPr id="365" name="Shape 365"/>
         <p:cNvGrpSpPr/>
         <p:nvPr/>
       </p:nvGrpSpPr>
@@ -4912,7 +4913,7 @@
       </p:grpSpPr>
       <p:sp>
         <p:nvSpPr>
-          <p:cNvPr id="365" name="Google Shape;365;g30304b9c80a_1_67:notes"/>
+          <p:cNvPr id="366" name="Google Shape;366;g2d40b766212_1_1:notes"/>
           <p:cNvSpPr/>
           <p:nvPr>
             <p:ph idx="2" type="sldImg"/>
@@ -4947,7 +4948,7 @@
       </p:sp>
       <p:sp>
         <p:nvSpPr>
-          <p:cNvPr id="366" name="Google Shape;366;g30304b9c80a_1_67:notes"/>
+          <p:cNvPr id="367" name="Google Shape;367;g2d40b766212_1_1:notes"/>
           <p:cNvSpPr txBox="1"/>
           <p:nvPr>
             <p:ph idx="1" type="body"/>
@@ -4997,7 +4998,7 @@
   <p:cSld>
     <p:spTree>
       <p:nvGrpSpPr>
-        <p:cNvPr id="371" name="Shape 371"/>
+        <p:cNvPr id="372" name="Shape 372"/>
         <p:cNvGrpSpPr/>
         <p:nvPr/>
       </p:nvGrpSpPr>
@@ -5011,7 +5012,7 @@
       </p:grpSpPr>
       <p:sp>
         <p:nvSpPr>
-          <p:cNvPr id="372" name="Google Shape;372;g239609b2c0c_0_42:notes"/>
+          <p:cNvPr id="373" name="Google Shape;373;g30304b9c80a_1_67:notes"/>
           <p:cNvSpPr/>
           <p:nvPr>
             <p:ph idx="2" type="sldImg"/>
@@ -5046,7 +5047,7 @@
       </p:sp>
       <p:sp>
         <p:nvSpPr>
-          <p:cNvPr id="373" name="Google Shape;373;g239609b2c0c_0_42:notes"/>
+          <p:cNvPr id="374" name="Google Shape;374;g30304b9c80a_1_67:notes"/>
           <p:cNvSpPr txBox="1"/>
           <p:nvPr>
             <p:ph idx="1" type="body"/>
@@ -5195,7 +5196,7 @@
   <p:cSld>
     <p:spTree>
       <p:nvGrpSpPr>
-        <p:cNvPr id="377" name="Shape 377"/>
+        <p:cNvPr id="379" name="Shape 379"/>
         <p:cNvGrpSpPr/>
         <p:nvPr/>
       </p:nvGrpSpPr>
@@ -5209,7 +5210,7 @@
       </p:grpSpPr>
       <p:sp>
         <p:nvSpPr>
-          <p:cNvPr id="378" name="Google Shape;378;g239609b2c0c_0_47:notes"/>
+          <p:cNvPr id="380" name="Google Shape;380;g239609b2c0c_0_42:notes"/>
           <p:cNvSpPr/>
           <p:nvPr>
             <p:ph idx="2" type="sldImg"/>
@@ -5244,7 +5245,106 @@
       </p:sp>
       <p:sp>
         <p:nvSpPr>
-          <p:cNvPr id="379" name="Google Shape;379;g239609b2c0c_0_47:notes"/>
+          <p:cNvPr id="381" name="Google Shape;381;g239609b2c0c_0_42:notes"/>
+          <p:cNvSpPr txBox="1"/>
+          <p:nvPr>
+            <p:ph idx="1" type="body"/>
+          </p:nvPr>
+        </p:nvSpPr>
+        <p:spPr>
+          <a:xfrm>
+            <a:off x="685800" y="4343400"/>
+            <a:ext cx="5486400" cy="4114800"/>
+          </a:xfrm>
+          <a:prstGeom prst="rect">
+            <a:avLst/>
+          </a:prstGeom>
+        </p:spPr>
+        <p:txBody>
+          <a:bodyPr anchorCtr="0" anchor="t" bIns="91425" lIns="91425" spcFirstLastPara="1" rIns="91425" wrap="square" tIns="91425">
+            <a:noAutofit/>
+          </a:bodyPr>
+          <a:lstStyle/>
+          <a:p>
+            <a:pPr indent="0" lvl="0" marL="0" rtl="0" algn="l">
+              <a:spcBef>
+                <a:spcPts val="0"/>
+              </a:spcBef>
+              <a:spcAft>
+                <a:spcPts val="0"/>
+              </a:spcAft>
+              <a:buNone/>
+            </a:pPr>
+            <a:r>
+              <a:t/>
+            </a:r>
+            <a:endParaRPr/>
+          </a:p>
+        </p:txBody>
+      </p:sp>
+    </p:spTree>
+  </p:cSld>
+  <p:clrMapOvr>
+    <a:masterClrMapping/>
+  </p:clrMapOvr>
+</p:notes>
+</file>
+
+<file path=ppt/notesSlides/notesSlide51.xml><?xml version="1.0" encoding="utf-8"?>
+<p:notes xmlns:a="http://schemas.openxmlformats.org/drawingml/2006/main" xmlns:r="http://schemas.openxmlformats.org/officeDocument/2006/relationships" xmlns:mc="http://schemas.openxmlformats.org/markup-compatibility/2006" xmlns:mv="urn:schemas-microsoft-com:mac:vml" xmlns:p="http://schemas.openxmlformats.org/presentationml/2006/main" xmlns:c="http://schemas.openxmlformats.org/drawingml/2006/chart" xmlns:dgm="http://schemas.openxmlformats.org/drawingml/2006/diagram" xmlns:o="urn:schemas-microsoft-com:office:office" xmlns:v="urn:schemas-microsoft-com:vml" xmlns:pvml="urn:schemas-microsoft-com:office:powerpoint" xmlns:com="http://schemas.openxmlformats.org/drawingml/2006/compatibility" xmlns:p14="http://schemas.microsoft.com/office/powerpoint/2010/main" xmlns:p15="http://schemas.microsoft.com/office/powerpoint/2012/main" xmlns:ahyp="http://schemas.microsoft.com/office/drawing/2018/hyperlinkcolor" showMasterPhAnim="0" showMasterSp="0">
+  <p:cSld>
+    <p:spTree>
+      <p:nvGrpSpPr>
+        <p:cNvPr id="385" name="Shape 385"/>
+        <p:cNvGrpSpPr/>
+        <p:nvPr/>
+      </p:nvGrpSpPr>
+      <p:grpSpPr>
+        <a:xfrm>
+          <a:off x="0" y="0"/>
+          <a:ext cx="0" cy="0"/>
+          <a:chOff x="0" y="0"/>
+          <a:chExt cx="0" cy="0"/>
+        </a:xfrm>
+      </p:grpSpPr>
+      <p:sp>
+        <p:nvSpPr>
+          <p:cNvPr id="386" name="Google Shape;386;g239609b2c0c_0_47:notes"/>
+          <p:cNvSpPr/>
+          <p:nvPr>
+            <p:ph idx="2" type="sldImg"/>
+          </p:nvPr>
+        </p:nvSpPr>
+        <p:spPr>
+          <a:xfrm>
+            <a:off x="381300" y="685800"/>
+            <a:ext cx="6096000" cy="3429000"/>
+          </a:xfrm>
+          <a:custGeom>
+            <a:rect b="b" l="l" r="r" t="t"/>
+            <a:pathLst>
+              <a:path extrusionOk="0" h="120000" w="120000">
+                <a:moveTo>
+                  <a:pt x="0" y="0"/>
+                </a:moveTo>
+                <a:lnTo>
+                  <a:pt x="120000" y="0"/>
+                </a:lnTo>
+                <a:lnTo>
+                  <a:pt x="120000" y="120000"/>
+                </a:lnTo>
+                <a:lnTo>
+                  <a:pt x="0" y="120000"/>
+                </a:lnTo>
+                <a:close/>
+              </a:path>
+            </a:pathLst>
+          </a:custGeom>
+        </p:spPr>
+      </p:sp>
+      <p:sp>
+        <p:nvSpPr>
+          <p:cNvPr id="387" name="Google Shape;387;g239609b2c0c_0_47:notes"/>
           <p:cNvSpPr txBox="1"/>
           <p:nvPr>
             <p:ph idx="1" type="body"/>
@@ -21859,7 +21959,7 @@
             </a:pPr>
             <a:r>
               <a:rPr lang="en"/>
-              <a:t>How to Structure a Class Implementation</a:t>
+              <a:t>Mixin Classes [1]</a:t>
             </a:r>
             <a:endParaRPr/>
           </a:p>
@@ -21895,16 +21995,11 @@
               <a:spcAft>
                 <a:spcPts val="0"/>
               </a:spcAft>
-              <a:buClr>
-                <a:schemeClr val="dk1"/>
-              </a:buClr>
-              <a:buSzPts val="1100"/>
-              <a:buFont typeface="Arial"/>
               <a:buNone/>
             </a:pPr>
             <a:r>
               <a:rPr lang="en"/>
-              <a:t>Group fields together, across traits or collaborations</a:t>
+              <a:t>A mixin class is a (typically small) class that </a:t>
             </a:r>
             <a:endParaRPr/>
           </a:p>
@@ -21921,14 +22016,34 @@
             </a:pPr>
             <a:r>
               <a:rPr lang="en"/>
-              <a:t>At top of file (most common) or bottom (less common)</a:t>
+              <a:t>Provides reusable code </a:t>
+            </a:r>
+            <a:r>
+              <a:rPr lang="en"/>
+              <a:t>focused on one aspect / trait / role of interest</a:t>
             </a:r>
             <a:endParaRPr/>
           </a:p>
           <a:p>
+            <a:pPr indent="0" lvl="0" marL="0" rtl="0" algn="l">
+              <a:spcBef>
+                <a:spcPts val="1200"/>
+              </a:spcBef>
+              <a:spcAft>
+                <a:spcPts val="0"/>
+              </a:spcAft>
+              <a:buNone/>
+            </a:pPr>
+            <a:r>
+              <a:rPr lang="en"/>
+              <a:t>A regular class then “mixes in” or inherits from one or more mixin classes to</a:t>
+            </a:r>
+            <a:endParaRPr/>
+          </a:p>
+          <a:p>
             <a:pPr indent="-342900" lvl="0" marL="457200" rtl="0" algn="l">
               <a:spcBef>
-                <a:spcPts val="0"/>
+                <a:spcPts val="1200"/>
               </a:spcBef>
               <a:spcAft>
                 <a:spcPts val="0"/>
@@ -21938,7 +22053,7 @@
             </a:pPr>
             <a:r>
               <a:rPr lang="en"/>
-              <a:t>Because implementation state works across collaborations</a:t>
+              <a:t>Compose the reusable code into the (larger) class</a:t>
             </a:r>
             <a:endParaRPr/>
           </a:p>
@@ -22014,6 +22129,48 @@
                 <a:schemeClr val="dk2"/>
               </a:solidFill>
             </a:endParaRPr>
+          </a:p>
+        </p:txBody>
+      </p:sp>
+      <p:sp>
+        <p:nvSpPr>
+          <p:cNvPr id="240" name="Google Shape;240;p36"/>
+          <p:cNvSpPr txBox="1"/>
+          <p:nvPr/>
+        </p:nvSpPr>
+        <p:spPr>
+          <a:xfrm>
+            <a:off x="0" y="4233672"/>
+            <a:ext cx="7315200" cy="914400"/>
+          </a:xfrm>
+          <a:prstGeom prst="rect">
+            <a:avLst/>
+          </a:prstGeom>
+          <a:noFill/>
+          <a:ln>
+            <a:noFill/>
+          </a:ln>
+        </p:spPr>
+        <p:txBody>
+          <a:bodyPr anchorCtr="0" anchor="b" bIns="91425" lIns="91425" spcFirstLastPara="1" rIns="91425" wrap="square" tIns="91425">
+            <a:noAutofit/>
+          </a:bodyPr>
+          <a:lstStyle/>
+          <a:p>
+            <a:pPr indent="0" lvl="0" marL="0" rtl="0" algn="l">
+              <a:spcBef>
+                <a:spcPts val="0"/>
+              </a:spcBef>
+              <a:spcAft>
+                <a:spcPts val="0"/>
+              </a:spcAft>
+              <a:buNone/>
+            </a:pPr>
+            <a:r>
+              <a:rPr lang="en"/>
+              <a:t>[1] Requires multiple inheritance or dedicated language mechanism</a:t>
+            </a:r>
+            <a:endParaRPr/>
           </a:p>
         </p:txBody>
       </p:sp>
@@ -22095,7 +22252,7 @@
   <p:cSld>
     <p:spTree>
       <p:nvGrpSpPr>
-        <p:cNvPr id="243" name="Shape 243"/>
+        <p:cNvPr id="244" name="Shape 244"/>
         <p:cNvGrpSpPr/>
         <p:nvPr/>
       </p:nvGrpSpPr>
@@ -22109,7 +22266,7 @@
       </p:grpSpPr>
       <p:sp>
         <p:nvSpPr>
-          <p:cNvPr id="244" name="Google Shape;244;p37"/>
+          <p:cNvPr id="245" name="Google Shape;245;p37"/>
           <p:cNvSpPr txBox="1"/>
           <p:nvPr>
             <p:ph type="title"/>
@@ -22141,7 +22298,7 @@
             </a:pPr>
             <a:r>
               <a:rPr lang="en"/>
-              <a:t>Tagging Interface</a:t>
+              <a:t>How to Structure a Class Implementation</a:t>
             </a:r>
             <a:endParaRPr/>
           </a:p>
@@ -22149,7 +22306,7 @@
       </p:sp>
       <p:sp>
         <p:nvSpPr>
-          <p:cNvPr id="245" name="Google Shape;245;p37"/>
+          <p:cNvPr id="246" name="Google Shape;246;p37"/>
           <p:cNvSpPr txBox="1"/>
           <p:nvPr>
             <p:ph idx="1" type="body"/>
@@ -22177,11 +22334,16 @@
               <a:spcAft>
                 <a:spcPts val="0"/>
               </a:spcAft>
+              <a:buClr>
+                <a:schemeClr val="dk1"/>
+              </a:buClr>
+              <a:buSzPts val="1100"/>
+              <a:buFont typeface="Arial"/>
               <a:buNone/>
             </a:pPr>
             <a:r>
               <a:rPr lang="en"/>
-              <a:t>A tagging interface is</a:t>
+              <a:t>Group fields together, across traits or collaborations</a:t>
             </a:r>
             <a:endParaRPr/>
           </a:p>
@@ -22198,7 +22360,7 @@
             </a:pPr>
             <a:r>
               <a:rPr lang="en"/>
-              <a:t>An interface that serves as a marker to the compiler to add “some magic”</a:t>
+              <a:t>At top of file (most common) or bottom (less common)</a:t>
             </a:r>
             <a:endParaRPr/>
           </a:p>
@@ -22215,55 +22377,7 @@
             </a:pPr>
             <a:r>
               <a:rPr lang="en"/>
-              <a:t>Typically void of any methods</a:t>
-            </a:r>
-            <a:endParaRPr/>
-          </a:p>
-          <a:p>
-            <a:pPr indent="-342900" lvl="0" marL="457200" rtl="0" algn="l">
-              <a:spcBef>
-                <a:spcPts val="0"/>
-              </a:spcBef>
-              <a:spcAft>
-                <a:spcPts val="0"/>
-              </a:spcAft>
-              <a:buSzPts val="1800"/>
-              <a:buChar char="●"/>
-            </a:pPr>
-            <a:r>
-              <a:rPr lang="en"/>
-              <a:t>A.k.a. marker interface</a:t>
-            </a:r>
-            <a:endParaRPr/>
-          </a:p>
-          <a:p>
-            <a:pPr indent="0" lvl="0" marL="0" rtl="0" algn="l">
-              <a:spcBef>
-                <a:spcPts val="1200"/>
-              </a:spcBef>
-              <a:spcAft>
-                <a:spcPts val="0"/>
-              </a:spcAft>
-              <a:buNone/>
-            </a:pPr>
-            <a:r>
-              <a:rPr lang="en"/>
-              <a:t>In Java, example tagging interfaces are Cloneable and Serializable</a:t>
-            </a:r>
-            <a:endParaRPr/>
-          </a:p>
-          <a:p>
-            <a:pPr indent="0" lvl="0" marL="0" rtl="0" algn="l">
-              <a:spcBef>
-                <a:spcPts val="1200"/>
-              </a:spcBef>
-              <a:spcAft>
-                <a:spcPts val="1200"/>
-              </a:spcAft>
-              <a:buNone/>
-            </a:pPr>
-            <a:r>
-              <a:t/>
+              <a:t>Because implementation state works across collaborations</a:t>
             </a:r>
             <a:endParaRPr/>
           </a:p>
@@ -22271,7 +22385,7 @@
       </p:sp>
       <p:sp>
         <p:nvSpPr>
-          <p:cNvPr id="246" name="Google Shape;246;p37"/>
+          <p:cNvPr id="247" name="Google Shape;247;p37"/>
           <p:cNvSpPr txBox="1"/>
           <p:nvPr>
             <p:ph idx="12" type="sldNum"/>
@@ -22355,7 +22469,7 @@
   <p:cSld>
     <p:spTree>
       <p:nvGrpSpPr>
-        <p:cNvPr id="250" name="Shape 250"/>
+        <p:cNvPr id="251" name="Shape 251"/>
         <p:cNvGrpSpPr/>
         <p:nvPr/>
       </p:nvGrpSpPr>
@@ -22369,7 +22483,267 @@
       </p:grpSpPr>
       <p:sp>
         <p:nvSpPr>
-          <p:cNvPr id="251" name="Google Shape;251;p38"/>
+          <p:cNvPr id="252" name="Google Shape;252;p38"/>
+          <p:cNvSpPr txBox="1"/>
+          <p:nvPr>
+            <p:ph type="title"/>
+          </p:nvPr>
+        </p:nvSpPr>
+        <p:spPr>
+          <a:xfrm>
+            <a:off x="0" y="0"/>
+            <a:ext cx="9144000" cy="685800"/>
+          </a:xfrm>
+          <a:prstGeom prst="rect">
+            <a:avLst/>
+          </a:prstGeom>
+        </p:spPr>
+        <p:txBody>
+          <a:bodyPr anchorCtr="0" anchor="ctr" bIns="91425" lIns="274300" spcFirstLastPara="1" rIns="91425" wrap="square" tIns="91425">
+            <a:noAutofit/>
+          </a:bodyPr>
+          <a:lstStyle/>
+          <a:p>
+            <a:pPr indent="0" lvl="0" marL="0" rtl="0" algn="l">
+              <a:spcBef>
+                <a:spcPts val="0"/>
+              </a:spcBef>
+              <a:spcAft>
+                <a:spcPts val="0"/>
+              </a:spcAft>
+              <a:buNone/>
+            </a:pPr>
+            <a:r>
+              <a:rPr lang="en"/>
+              <a:t>Tagging Interface</a:t>
+            </a:r>
+            <a:endParaRPr/>
+          </a:p>
+        </p:txBody>
+      </p:sp>
+      <p:sp>
+        <p:nvSpPr>
+          <p:cNvPr id="253" name="Google Shape;253;p38"/>
+          <p:cNvSpPr txBox="1"/>
+          <p:nvPr>
+            <p:ph idx="1" type="body"/>
+          </p:nvPr>
+        </p:nvSpPr>
+        <p:spPr>
+          <a:xfrm>
+            <a:off x="274320" y="914400"/>
+            <a:ext cx="8595300" cy="4114800"/>
+          </a:xfrm>
+          <a:prstGeom prst="rect">
+            <a:avLst/>
+          </a:prstGeom>
+        </p:spPr>
+        <p:txBody>
+          <a:bodyPr anchorCtr="0" anchor="t" bIns="0" lIns="0" spcFirstLastPara="1" rIns="0" wrap="square" tIns="0">
+            <a:noAutofit/>
+          </a:bodyPr>
+          <a:lstStyle/>
+          <a:p>
+            <a:pPr indent="0" lvl="0" marL="0" rtl="0" algn="l">
+              <a:spcBef>
+                <a:spcPts val="0"/>
+              </a:spcBef>
+              <a:spcAft>
+                <a:spcPts val="0"/>
+              </a:spcAft>
+              <a:buNone/>
+            </a:pPr>
+            <a:r>
+              <a:rPr lang="en"/>
+              <a:t>A tagging interface is</a:t>
+            </a:r>
+            <a:endParaRPr/>
+          </a:p>
+          <a:p>
+            <a:pPr indent="-342900" lvl="0" marL="457200" rtl="0" algn="l">
+              <a:spcBef>
+                <a:spcPts val="1200"/>
+              </a:spcBef>
+              <a:spcAft>
+                <a:spcPts val="0"/>
+              </a:spcAft>
+              <a:buSzPts val="1800"/>
+              <a:buChar char="●"/>
+            </a:pPr>
+            <a:r>
+              <a:rPr lang="en"/>
+              <a:t>An interface that serves as a marker to the compiler to add “some magic”</a:t>
+            </a:r>
+            <a:endParaRPr/>
+          </a:p>
+          <a:p>
+            <a:pPr indent="-342900" lvl="0" marL="457200" rtl="0" algn="l">
+              <a:spcBef>
+                <a:spcPts val="0"/>
+              </a:spcBef>
+              <a:spcAft>
+                <a:spcPts val="0"/>
+              </a:spcAft>
+              <a:buSzPts val="1800"/>
+              <a:buChar char="●"/>
+            </a:pPr>
+            <a:r>
+              <a:rPr lang="en"/>
+              <a:t>Typically void of any methods</a:t>
+            </a:r>
+            <a:endParaRPr/>
+          </a:p>
+          <a:p>
+            <a:pPr indent="-342900" lvl="0" marL="457200" rtl="0" algn="l">
+              <a:spcBef>
+                <a:spcPts val="0"/>
+              </a:spcBef>
+              <a:spcAft>
+                <a:spcPts val="0"/>
+              </a:spcAft>
+              <a:buSzPts val="1800"/>
+              <a:buChar char="●"/>
+            </a:pPr>
+            <a:r>
+              <a:rPr lang="en"/>
+              <a:t>A.k.a. marker interface</a:t>
+            </a:r>
+            <a:endParaRPr/>
+          </a:p>
+          <a:p>
+            <a:pPr indent="0" lvl="0" marL="0" rtl="0" algn="l">
+              <a:spcBef>
+                <a:spcPts val="1200"/>
+              </a:spcBef>
+              <a:spcAft>
+                <a:spcPts val="0"/>
+              </a:spcAft>
+              <a:buNone/>
+            </a:pPr>
+            <a:r>
+              <a:rPr lang="en"/>
+              <a:t>In Java, example tagging interfaces are Cloneable and Serializable</a:t>
+            </a:r>
+            <a:endParaRPr/>
+          </a:p>
+          <a:p>
+            <a:pPr indent="0" lvl="0" marL="0" rtl="0" algn="l">
+              <a:spcBef>
+                <a:spcPts val="1200"/>
+              </a:spcBef>
+              <a:spcAft>
+                <a:spcPts val="1200"/>
+              </a:spcAft>
+              <a:buNone/>
+            </a:pPr>
+            <a:r>
+              <a:t/>
+            </a:r>
+            <a:endParaRPr/>
+          </a:p>
+        </p:txBody>
+      </p:sp>
+      <p:sp>
+        <p:nvSpPr>
+          <p:cNvPr id="254" name="Google Shape;254;p38"/>
+          <p:cNvSpPr txBox="1"/>
+          <p:nvPr>
+            <p:ph idx="12" type="sldNum"/>
+          </p:nvPr>
+        </p:nvSpPr>
+        <p:spPr>
+          <a:xfrm>
+            <a:off x="7315202" y="4416550"/>
+            <a:ext cx="1828800" cy="731400"/>
+          </a:xfrm>
+          <a:prstGeom prst="rect">
+            <a:avLst/>
+          </a:prstGeom>
+        </p:spPr>
+        <p:txBody>
+          <a:bodyPr anchorCtr="0" anchor="b" bIns="91425" lIns="91425" spcFirstLastPara="1" rIns="91425" wrap="square" tIns="91425">
+            <a:noAutofit/>
+          </a:bodyPr>
+          <a:lstStyle/>
+          <a:p>
+            <a:pPr indent="0" lvl="0" marL="0" rtl="0" algn="r">
+              <a:spcBef>
+                <a:spcPts val="0"/>
+              </a:spcBef>
+              <a:spcAft>
+                <a:spcPts val="0"/>
+              </a:spcAft>
+              <a:buNone/>
+            </a:pPr>
+            <a:fld id="{00000000-1234-1234-1234-123412341234}" type="slidenum">
+              <a:rPr lang="en"/>
+              <a:t>‹#›</a:t>
+            </a:fld>
+            <a:endParaRPr/>
+          </a:p>
+          <a:p>
+            <a:pPr indent="0" lvl="0" marL="0" rtl="0" algn="r">
+              <a:spcBef>
+                <a:spcPts val="0"/>
+              </a:spcBef>
+              <a:spcAft>
+                <a:spcPts val="0"/>
+              </a:spcAft>
+              <a:buNone/>
+            </a:pPr>
+            <a:r>
+              <a:rPr b="0" lang="en" sz="900" u="sng">
+                <a:solidFill>
+                  <a:schemeClr val="hlink"/>
+                </a:solidFill>
+                <a:hlinkClick r:id="rId3"/>
+              </a:rPr>
+              <a:t>https://oss.cs.fau.de</a:t>
+            </a:r>
+            <a:r>
+              <a:rPr b="0" lang="en" sz="900">
+                <a:solidFill>
+                  <a:schemeClr val="dk2"/>
+                </a:solidFill>
+              </a:rPr>
+              <a:t> </a:t>
+            </a:r>
+            <a:endParaRPr b="0" sz="900">
+              <a:solidFill>
+                <a:schemeClr val="dk2"/>
+              </a:solidFill>
+            </a:endParaRPr>
+          </a:p>
+        </p:txBody>
+      </p:sp>
+    </p:spTree>
+  </p:cSld>
+  <p:clrMapOvr>
+    <a:masterClrMapping/>
+  </p:clrMapOvr>
+</p:sld>
+</file>
+
+<file path=ppt/slides/slide32.xml><?xml version="1.0" encoding="utf-8"?>
+<p:sld xmlns:a="http://schemas.openxmlformats.org/drawingml/2006/main" xmlns:r="http://schemas.openxmlformats.org/officeDocument/2006/relationships" xmlns:mc="http://schemas.openxmlformats.org/markup-compatibility/2006" xmlns:mv="urn:schemas-microsoft-com:mac:vml" xmlns:p="http://schemas.openxmlformats.org/presentationml/2006/main" xmlns:c="http://schemas.openxmlformats.org/drawingml/2006/chart" xmlns:dgm="http://schemas.openxmlformats.org/drawingml/2006/diagram" xmlns:o="urn:schemas-microsoft-com:office:office" xmlns:v="urn:schemas-microsoft-com:vml" xmlns:pvml="urn:schemas-microsoft-com:office:powerpoint" xmlns:com="http://schemas.openxmlformats.org/drawingml/2006/compatibility" xmlns:p14="http://schemas.microsoft.com/office/powerpoint/2010/main" xmlns:p15="http://schemas.microsoft.com/office/powerpoint/2012/main" xmlns:ahyp="http://schemas.microsoft.com/office/drawing/2018/hyperlinkcolor">
+  <p:cSld>
+    <p:spTree>
+      <p:nvGrpSpPr>
+        <p:cNvPr id="258" name="Shape 258"/>
+        <p:cNvGrpSpPr/>
+        <p:nvPr/>
+      </p:nvGrpSpPr>
+      <p:grpSpPr>
+        <a:xfrm>
+          <a:off x="0" y="0"/>
+          <a:ext cx="0" cy="0"/>
+          <a:chOff x="0" y="0"/>
+          <a:chExt cx="0" cy="0"/>
+        </a:xfrm>
+      </p:grpSpPr>
+      <p:sp>
+        <p:nvSpPr>
+          <p:cNvPr id="259" name="Google Shape;259;p39"/>
           <p:cNvSpPr txBox="1"/>
           <p:nvPr>
             <p:ph type="title"/>
@@ -22415,12 +22789,12 @@
 </p:sld>
 </file>
 
-<file path=ppt/slides/slide32.xml><?xml version="1.0" encoding="utf-8"?>
+<file path=ppt/slides/slide33.xml><?xml version="1.0" encoding="utf-8"?>
 <p:sld xmlns:a="http://schemas.openxmlformats.org/drawingml/2006/main" xmlns:r="http://schemas.openxmlformats.org/officeDocument/2006/relationships" xmlns:mc="http://schemas.openxmlformats.org/markup-compatibility/2006" xmlns:mv="urn:schemas-microsoft-com:mac:vml" xmlns:p="http://schemas.openxmlformats.org/presentationml/2006/main" xmlns:c="http://schemas.openxmlformats.org/drawingml/2006/chart" xmlns:dgm="http://schemas.openxmlformats.org/drawingml/2006/diagram" xmlns:o="urn:schemas-microsoft-com:office:office" xmlns:v="urn:schemas-microsoft-com:vml" xmlns:pvml="urn:schemas-microsoft-com:office:powerpoint" xmlns:com="http://schemas.openxmlformats.org/drawingml/2006/compatibility" xmlns:p14="http://schemas.microsoft.com/office/powerpoint/2010/main" xmlns:p15="http://schemas.microsoft.com/office/powerpoint/2012/main" xmlns:ahyp="http://schemas.microsoft.com/office/drawing/2018/hyperlinkcolor">
   <p:cSld>
     <p:spTree>
       <p:nvGrpSpPr>
-        <p:cNvPr id="255" name="Shape 255"/>
+        <p:cNvPr id="263" name="Shape 263"/>
         <p:cNvGrpSpPr/>
         <p:nvPr/>
       </p:nvGrpSpPr>
@@ -22434,7 +22808,7 @@
       </p:grpSpPr>
       <p:sp>
         <p:nvSpPr>
-          <p:cNvPr id="256" name="Google Shape;256;p39"/>
+          <p:cNvPr id="264" name="Google Shape;264;p40"/>
           <p:cNvSpPr txBox="1"/>
           <p:nvPr>
             <p:ph type="title"/>
@@ -22474,7 +22848,7 @@
       </p:sp>
       <p:sp>
         <p:nvSpPr>
-          <p:cNvPr id="257" name="Google Shape;257;p39"/>
+          <p:cNvPr id="265" name="Google Shape;265;p40"/>
           <p:cNvSpPr txBox="1"/>
           <p:nvPr>
             <p:ph idx="1" type="body"/>
@@ -22567,7 +22941,7 @@
       </p:sp>
       <p:sp>
         <p:nvSpPr>
-          <p:cNvPr id="258" name="Google Shape;258;p39"/>
+          <p:cNvPr id="266" name="Google Shape;266;p40"/>
           <p:cNvSpPr txBox="1"/>
           <p:nvPr>
             <p:ph idx="12" type="sldNum"/>
@@ -22646,12 +23020,12 @@
 </p:sld>
 </file>
 
-<file path=ppt/slides/slide33.xml><?xml version="1.0" encoding="utf-8"?>
+<file path=ppt/slides/slide34.xml><?xml version="1.0" encoding="utf-8"?>
 <p:sld xmlns:a="http://schemas.openxmlformats.org/drawingml/2006/main" xmlns:r="http://schemas.openxmlformats.org/officeDocument/2006/relationships" xmlns:mc="http://schemas.openxmlformats.org/markup-compatibility/2006" xmlns:mv="urn:schemas-microsoft-com:mac:vml" xmlns:p="http://schemas.openxmlformats.org/presentationml/2006/main" xmlns:c="http://schemas.openxmlformats.org/drawingml/2006/chart" xmlns:dgm="http://schemas.openxmlformats.org/drawingml/2006/diagram" xmlns:o="urn:schemas-microsoft-com:office:office" xmlns:v="urn:schemas-microsoft-com:vml" xmlns:pvml="urn:schemas-microsoft-com:office:powerpoint" xmlns:com="http://schemas.openxmlformats.org/drawingml/2006/compatibility" xmlns:p14="http://schemas.microsoft.com/office/powerpoint/2010/main" xmlns:p15="http://schemas.microsoft.com/office/powerpoint/2012/main" xmlns:ahyp="http://schemas.microsoft.com/office/drawing/2018/hyperlinkcolor">
   <p:cSld>
     <p:spTree>
       <p:nvGrpSpPr>
-        <p:cNvPr id="262" name="Shape 262"/>
+        <p:cNvPr id="270" name="Shape 270"/>
         <p:cNvGrpSpPr/>
         <p:nvPr/>
       </p:nvGrpSpPr>
@@ -22665,7 +23039,7 @@
       </p:grpSpPr>
       <p:sp>
         <p:nvSpPr>
-          <p:cNvPr id="263" name="Google Shape;263;p40"/>
+          <p:cNvPr id="271" name="Google Shape;271;p41"/>
           <p:cNvSpPr txBox="1"/>
           <p:nvPr>
             <p:ph type="title"/>
@@ -22705,7 +23079,7 @@
       </p:sp>
       <p:sp>
         <p:nvSpPr>
-          <p:cNvPr id="264" name="Google Shape;264;p40"/>
+          <p:cNvPr id="272" name="Google Shape;272;p41"/>
           <p:cNvSpPr txBox="1"/>
           <p:nvPr>
             <p:ph idx="12" type="sldNum"/>
@@ -22778,7 +23152,7 @@
       </p:sp>
       <p:pic>
         <p:nvPicPr>
-          <p:cNvPr id="265" name="Google Shape;265;p40"/>
+          <p:cNvPr id="273" name="Google Shape;273;p41"/>
           <p:cNvPicPr preferRelativeResize="0"/>
           <p:nvPr/>
         </p:nvPicPr>
@@ -22812,12 +23186,12 @@
 </p:sld>
 </file>
 
-<file path=ppt/slides/slide34.xml><?xml version="1.0" encoding="utf-8"?>
+<file path=ppt/slides/slide35.xml><?xml version="1.0" encoding="utf-8"?>
 <p:sld xmlns:a="http://schemas.openxmlformats.org/drawingml/2006/main" xmlns:r="http://schemas.openxmlformats.org/officeDocument/2006/relationships" xmlns:mc="http://schemas.openxmlformats.org/markup-compatibility/2006" xmlns:mv="urn:schemas-microsoft-com:mac:vml" xmlns:p="http://schemas.openxmlformats.org/presentationml/2006/main" xmlns:c="http://schemas.openxmlformats.org/drawingml/2006/chart" xmlns:dgm="http://schemas.openxmlformats.org/drawingml/2006/diagram" xmlns:o="urn:schemas-microsoft-com:office:office" xmlns:v="urn:schemas-microsoft-com:vml" xmlns:pvml="urn:schemas-microsoft-com:office:powerpoint" xmlns:com="http://schemas.openxmlformats.org/drawingml/2006/compatibility" xmlns:p14="http://schemas.microsoft.com/office/powerpoint/2010/main" xmlns:p15="http://schemas.microsoft.com/office/powerpoint/2012/main" xmlns:ahyp="http://schemas.microsoft.com/office/drawing/2018/hyperlinkcolor">
   <p:cSld>
     <p:spTree>
       <p:nvGrpSpPr>
-        <p:cNvPr id="269" name="Shape 269"/>
+        <p:cNvPr id="277" name="Shape 277"/>
         <p:cNvGrpSpPr/>
         <p:nvPr/>
       </p:nvGrpSpPr>
@@ -22831,7 +23205,7 @@
       </p:grpSpPr>
       <p:sp>
         <p:nvSpPr>
-          <p:cNvPr id="270" name="Google Shape;270;p41"/>
+          <p:cNvPr id="278" name="Google Shape;278;p42"/>
           <p:cNvSpPr txBox="1"/>
           <p:nvPr>
             <p:ph type="title"/>
@@ -22871,7 +23245,7 @@
       </p:sp>
       <p:sp>
         <p:nvSpPr>
-          <p:cNvPr id="271" name="Google Shape;271;p41"/>
+          <p:cNvPr id="279" name="Google Shape;279;p42"/>
           <p:cNvSpPr txBox="1"/>
           <p:nvPr>
             <p:ph idx="1" type="body"/>
@@ -22970,7 +23344,7 @@
       </p:sp>
       <p:sp>
         <p:nvSpPr>
-          <p:cNvPr id="272" name="Google Shape;272;p41"/>
+          <p:cNvPr id="280" name="Google Shape;280;p42"/>
           <p:cNvSpPr txBox="1"/>
           <p:nvPr>
             <p:ph idx="12" type="sldNum"/>
@@ -23049,12 +23423,12 @@
 </p:sld>
 </file>
 
-<file path=ppt/slides/slide35.xml><?xml version="1.0" encoding="utf-8"?>
+<file path=ppt/slides/slide36.xml><?xml version="1.0" encoding="utf-8"?>
 <p:sld xmlns:a="http://schemas.openxmlformats.org/drawingml/2006/main" xmlns:r="http://schemas.openxmlformats.org/officeDocument/2006/relationships" xmlns:mc="http://schemas.openxmlformats.org/markup-compatibility/2006" xmlns:mv="urn:schemas-microsoft-com:mac:vml" xmlns:p="http://schemas.openxmlformats.org/presentationml/2006/main" xmlns:c="http://schemas.openxmlformats.org/drawingml/2006/chart" xmlns:dgm="http://schemas.openxmlformats.org/drawingml/2006/diagram" xmlns:o="urn:schemas-microsoft-com:office:office" xmlns:v="urn:schemas-microsoft-com:vml" xmlns:pvml="urn:schemas-microsoft-com:office:powerpoint" xmlns:com="http://schemas.openxmlformats.org/drawingml/2006/compatibility" xmlns:p14="http://schemas.microsoft.com/office/powerpoint/2010/main" xmlns:p15="http://schemas.microsoft.com/office/powerpoint/2012/main" xmlns:ahyp="http://schemas.microsoft.com/office/drawing/2018/hyperlinkcolor">
   <p:cSld>
     <p:spTree>
       <p:nvGrpSpPr>
-        <p:cNvPr id="276" name="Shape 276"/>
+        <p:cNvPr id="284" name="Shape 284"/>
         <p:cNvGrpSpPr/>
         <p:nvPr/>
       </p:nvGrpSpPr>
@@ -23068,7 +23442,7 @@
       </p:grpSpPr>
       <p:sp>
         <p:nvSpPr>
-          <p:cNvPr id="277" name="Google Shape;277;p42"/>
+          <p:cNvPr id="285" name="Google Shape;285;p43"/>
           <p:cNvSpPr txBox="1"/>
           <p:nvPr>
             <p:ph type="title"/>
@@ -23108,7 +23482,7 @@
       </p:sp>
       <p:sp>
         <p:nvSpPr>
-          <p:cNvPr id="278" name="Google Shape;278;p42"/>
+          <p:cNvPr id="286" name="Google Shape;286;p43"/>
           <p:cNvSpPr txBox="1"/>
           <p:nvPr>
             <p:ph idx="1" type="body"/>
@@ -25388,7 +25762,7 @@
       </p:sp>
       <p:sp>
         <p:nvSpPr>
-          <p:cNvPr id="279" name="Google Shape;279;p42"/>
+          <p:cNvPr id="287" name="Google Shape;287;p43"/>
           <p:cNvSpPr txBox="1"/>
           <p:nvPr>
             <p:ph idx="12" type="sldNum"/>
@@ -25467,12 +25841,12 @@
 </p:sld>
 </file>
 
-<file path=ppt/slides/slide36.xml><?xml version="1.0" encoding="utf-8"?>
+<file path=ppt/slides/slide37.xml><?xml version="1.0" encoding="utf-8"?>
 <p:sld xmlns:a="http://schemas.openxmlformats.org/drawingml/2006/main" xmlns:r="http://schemas.openxmlformats.org/officeDocument/2006/relationships" xmlns:mc="http://schemas.openxmlformats.org/markup-compatibility/2006" xmlns:mv="urn:schemas-microsoft-com:mac:vml" xmlns:p="http://schemas.openxmlformats.org/presentationml/2006/main" xmlns:c="http://schemas.openxmlformats.org/drawingml/2006/chart" xmlns:dgm="http://schemas.openxmlformats.org/drawingml/2006/diagram" xmlns:o="urn:schemas-microsoft-com:office:office" xmlns:v="urn:schemas-microsoft-com:vml" xmlns:pvml="urn:schemas-microsoft-com:office:powerpoint" xmlns:com="http://schemas.openxmlformats.org/drawingml/2006/compatibility" xmlns:p14="http://schemas.microsoft.com/office/powerpoint/2010/main" xmlns:p15="http://schemas.microsoft.com/office/powerpoint/2012/main" xmlns:ahyp="http://schemas.microsoft.com/office/drawing/2018/hyperlinkcolor">
   <p:cSld>
     <p:spTree>
       <p:nvGrpSpPr>
-        <p:cNvPr id="283" name="Shape 283"/>
+        <p:cNvPr id="291" name="Shape 291"/>
         <p:cNvGrpSpPr/>
         <p:nvPr/>
       </p:nvGrpSpPr>
@@ -25486,7 +25860,7 @@
       </p:grpSpPr>
       <p:sp>
         <p:nvSpPr>
-          <p:cNvPr id="284" name="Google Shape;284;p43"/>
+          <p:cNvPr id="292" name="Google Shape;292;p44"/>
           <p:cNvSpPr txBox="1"/>
           <p:nvPr>
             <p:ph type="title"/>
@@ -25526,7 +25900,7 @@
       </p:sp>
       <p:sp>
         <p:nvSpPr>
-          <p:cNvPr id="285" name="Google Shape;285;p43"/>
+          <p:cNvPr id="293" name="Google Shape;293;p44"/>
           <p:cNvSpPr txBox="1"/>
           <p:nvPr>
             <p:ph idx="1" type="body"/>
@@ -25622,7 +25996,7 @@
       </p:sp>
       <p:sp>
         <p:nvSpPr>
-          <p:cNvPr id="286" name="Google Shape;286;p43"/>
+          <p:cNvPr id="294" name="Google Shape;294;p44"/>
           <p:cNvSpPr txBox="1"/>
           <p:nvPr>
             <p:ph idx="12" type="sldNum"/>
@@ -25701,12 +26075,12 @@
 </p:sld>
 </file>
 
-<file path=ppt/slides/slide37.xml><?xml version="1.0" encoding="utf-8"?>
+<file path=ppt/slides/slide38.xml><?xml version="1.0" encoding="utf-8"?>
 <p:sld xmlns:a="http://schemas.openxmlformats.org/drawingml/2006/main" xmlns:r="http://schemas.openxmlformats.org/officeDocument/2006/relationships" xmlns:mc="http://schemas.openxmlformats.org/markup-compatibility/2006" xmlns:mv="urn:schemas-microsoft-com:mac:vml" xmlns:p="http://schemas.openxmlformats.org/presentationml/2006/main" xmlns:c="http://schemas.openxmlformats.org/drawingml/2006/chart" xmlns:dgm="http://schemas.openxmlformats.org/drawingml/2006/diagram" xmlns:o="urn:schemas-microsoft-com:office:office" xmlns:v="urn:schemas-microsoft-com:vml" xmlns:pvml="urn:schemas-microsoft-com:office:powerpoint" xmlns:com="http://schemas.openxmlformats.org/drawingml/2006/compatibility" xmlns:p14="http://schemas.microsoft.com/office/powerpoint/2010/main" xmlns:p15="http://schemas.microsoft.com/office/powerpoint/2012/main" xmlns:ahyp="http://schemas.microsoft.com/office/drawing/2018/hyperlinkcolor">
   <p:cSld>
     <p:spTree>
       <p:nvGrpSpPr>
-        <p:cNvPr id="290" name="Shape 290"/>
+        <p:cNvPr id="298" name="Shape 298"/>
         <p:cNvGrpSpPr/>
         <p:nvPr/>
       </p:nvGrpSpPr>
@@ -25720,7 +26094,7 @@
       </p:grpSpPr>
       <p:sp>
         <p:nvSpPr>
-          <p:cNvPr id="291" name="Google Shape;291;p44"/>
+          <p:cNvPr id="299" name="Google Shape;299;p45"/>
           <p:cNvSpPr txBox="1"/>
           <p:nvPr>
             <p:ph type="title"/>
@@ -25760,7 +26134,7 @@
       </p:sp>
       <p:sp>
         <p:nvSpPr>
-          <p:cNvPr id="292" name="Google Shape;292;p44"/>
+          <p:cNvPr id="300" name="Google Shape;300;p45"/>
           <p:cNvSpPr txBox="1"/>
           <p:nvPr>
             <p:ph idx="1" type="body"/>
@@ -25816,7 +26190,7 @@
       </p:sp>
       <p:sp>
         <p:nvSpPr>
-          <p:cNvPr id="293" name="Google Shape;293;p44"/>
+          <p:cNvPr id="301" name="Google Shape;301;p45"/>
           <p:cNvSpPr txBox="1"/>
           <p:nvPr>
             <p:ph idx="12" type="sldNum"/>
@@ -25895,12 +26269,12 @@
 </p:sld>
 </file>
 
-<file path=ppt/slides/slide38.xml><?xml version="1.0" encoding="utf-8"?>
+<file path=ppt/slides/slide39.xml><?xml version="1.0" encoding="utf-8"?>
 <p:sld xmlns:a="http://schemas.openxmlformats.org/drawingml/2006/main" xmlns:r="http://schemas.openxmlformats.org/officeDocument/2006/relationships" xmlns:mc="http://schemas.openxmlformats.org/markup-compatibility/2006" xmlns:mv="urn:schemas-microsoft-com:mac:vml" xmlns:p="http://schemas.openxmlformats.org/presentationml/2006/main" xmlns:c="http://schemas.openxmlformats.org/drawingml/2006/chart" xmlns:dgm="http://schemas.openxmlformats.org/drawingml/2006/diagram" xmlns:o="urn:schemas-microsoft-com:office:office" xmlns:v="urn:schemas-microsoft-com:vml" xmlns:pvml="urn:schemas-microsoft-com:office:powerpoint" xmlns:com="http://schemas.openxmlformats.org/drawingml/2006/compatibility" xmlns:p14="http://schemas.microsoft.com/office/powerpoint/2010/main" xmlns:p15="http://schemas.microsoft.com/office/powerpoint/2012/main" xmlns:ahyp="http://schemas.microsoft.com/office/drawing/2018/hyperlinkcolor">
   <p:cSld>
     <p:spTree>
       <p:nvGrpSpPr>
-        <p:cNvPr id="297" name="Shape 297"/>
+        <p:cNvPr id="305" name="Shape 305"/>
         <p:cNvGrpSpPr/>
         <p:nvPr/>
       </p:nvGrpSpPr>
@@ -25914,7 +26288,7 @@
       </p:grpSpPr>
       <p:sp>
         <p:nvSpPr>
-          <p:cNvPr id="298" name="Google Shape;298;p45"/>
+          <p:cNvPr id="306" name="Google Shape;306;p46"/>
           <p:cNvSpPr txBox="1"/>
           <p:nvPr>
             <p:ph type="title"/>
@@ -25954,7 +26328,7 @@
       </p:sp>
       <p:sp>
         <p:nvSpPr>
-          <p:cNvPr id="299" name="Google Shape;299;p45"/>
+          <p:cNvPr id="307" name="Google Shape;307;p46"/>
           <p:cNvSpPr txBox="1"/>
           <p:nvPr>
             <p:ph idx="1" type="body"/>
@@ -26034,217 +26408,7 @@
       </p:sp>
       <p:sp>
         <p:nvSpPr>
-          <p:cNvPr id="300" name="Google Shape;300;p45"/>
-          <p:cNvSpPr txBox="1"/>
-          <p:nvPr>
-            <p:ph idx="12" type="sldNum"/>
-          </p:nvPr>
-        </p:nvSpPr>
-        <p:spPr>
-          <a:xfrm>
-            <a:off x="7315202" y="4416550"/>
-            <a:ext cx="1828800" cy="731400"/>
-          </a:xfrm>
-          <a:prstGeom prst="rect">
-            <a:avLst/>
-          </a:prstGeom>
-        </p:spPr>
-        <p:txBody>
-          <a:bodyPr anchorCtr="0" anchor="b" bIns="91425" lIns="91425" spcFirstLastPara="1" rIns="91425" wrap="square" tIns="91425">
-            <a:noAutofit/>
-          </a:bodyPr>
-          <a:lstStyle/>
-          <a:p>
-            <a:pPr indent="0" lvl="0" marL="0" rtl="0" algn="r">
-              <a:spcBef>
-                <a:spcPts val="0"/>
-              </a:spcBef>
-              <a:spcAft>
-                <a:spcPts val="0"/>
-              </a:spcAft>
-              <a:buNone/>
-            </a:pPr>
-            <a:fld id="{00000000-1234-1234-1234-123412341234}" type="slidenum">
-              <a:rPr lang="en"/>
-              <a:t>‹#›</a:t>
-            </a:fld>
-            <a:endParaRPr/>
-          </a:p>
-          <a:p>
-            <a:pPr indent="0" lvl="0" marL="0" rtl="0" algn="r">
-              <a:spcBef>
-                <a:spcPts val="0"/>
-              </a:spcBef>
-              <a:spcAft>
-                <a:spcPts val="0"/>
-              </a:spcAft>
-              <a:buNone/>
-            </a:pPr>
-            <a:r>
-              <a:rPr b="0" lang="en" sz="900" u="sng">
-                <a:solidFill>
-                  <a:schemeClr val="hlink"/>
-                </a:solidFill>
-                <a:hlinkClick r:id="rId3"/>
-              </a:rPr>
-              <a:t>https://oss.cs.fau.de</a:t>
-            </a:r>
-            <a:r>
-              <a:rPr b="0" lang="en" sz="900">
-                <a:solidFill>
-                  <a:schemeClr val="dk2"/>
-                </a:solidFill>
-              </a:rPr>
-              <a:t> </a:t>
-            </a:r>
-            <a:endParaRPr b="0" sz="900">
-              <a:solidFill>
-                <a:schemeClr val="dk2"/>
-              </a:solidFill>
-            </a:endParaRPr>
-          </a:p>
-        </p:txBody>
-      </p:sp>
-    </p:spTree>
-  </p:cSld>
-  <p:clrMapOvr>
-    <a:masterClrMapping/>
-  </p:clrMapOvr>
-</p:sld>
-</file>
-
-<file path=ppt/slides/slide39.xml><?xml version="1.0" encoding="utf-8"?>
-<p:sld xmlns:a="http://schemas.openxmlformats.org/drawingml/2006/main" xmlns:r="http://schemas.openxmlformats.org/officeDocument/2006/relationships" xmlns:mc="http://schemas.openxmlformats.org/markup-compatibility/2006" xmlns:mv="urn:schemas-microsoft-com:mac:vml" xmlns:p="http://schemas.openxmlformats.org/presentationml/2006/main" xmlns:c="http://schemas.openxmlformats.org/drawingml/2006/chart" xmlns:dgm="http://schemas.openxmlformats.org/drawingml/2006/diagram" xmlns:o="urn:schemas-microsoft-com:office:office" xmlns:v="urn:schemas-microsoft-com:vml" xmlns:pvml="urn:schemas-microsoft-com:office:powerpoint" xmlns:com="http://schemas.openxmlformats.org/drawingml/2006/compatibility" xmlns:p14="http://schemas.microsoft.com/office/powerpoint/2010/main" xmlns:p15="http://schemas.microsoft.com/office/powerpoint/2012/main" xmlns:ahyp="http://schemas.microsoft.com/office/drawing/2018/hyperlinkcolor">
-  <p:cSld>
-    <p:spTree>
-      <p:nvGrpSpPr>
-        <p:cNvPr id="304" name="Shape 304"/>
-        <p:cNvGrpSpPr/>
-        <p:nvPr/>
-      </p:nvGrpSpPr>
-      <p:grpSpPr>
-        <a:xfrm>
-          <a:off x="0" y="0"/>
-          <a:ext cx="0" cy="0"/>
-          <a:chOff x="0" y="0"/>
-          <a:chExt cx="0" cy="0"/>
-        </a:xfrm>
-      </p:grpSpPr>
-      <p:sp>
-        <p:nvSpPr>
-          <p:cNvPr id="305" name="Google Shape;305;p46"/>
-          <p:cNvSpPr txBox="1"/>
-          <p:nvPr>
-            <p:ph type="title"/>
-          </p:nvPr>
-        </p:nvSpPr>
-        <p:spPr>
-          <a:xfrm>
-            <a:off x="0" y="0"/>
-            <a:ext cx="9144000" cy="685800"/>
-          </a:xfrm>
-          <a:prstGeom prst="rect">
-            <a:avLst/>
-          </a:prstGeom>
-        </p:spPr>
-        <p:txBody>
-          <a:bodyPr anchorCtr="0" anchor="ctr" bIns="91425" lIns="274300" spcFirstLastPara="1" rIns="91425" wrap="square" tIns="91425">
-            <a:noAutofit/>
-          </a:bodyPr>
-          <a:lstStyle/>
-          <a:p>
-            <a:pPr indent="0" lvl="0" marL="0" rtl="0" algn="l">
-              <a:spcBef>
-                <a:spcPts val="0"/>
-              </a:spcBef>
-              <a:spcAft>
-                <a:spcPts val="0"/>
-              </a:spcAft>
-              <a:buNone/>
-            </a:pPr>
-            <a:r>
-              <a:rPr lang="en"/>
-              <a:t>The Open / Closed Principle</a:t>
-            </a:r>
-            <a:endParaRPr/>
-          </a:p>
-        </p:txBody>
-      </p:sp>
-      <p:sp>
-        <p:nvSpPr>
-          <p:cNvPr id="306" name="Google Shape;306;p46"/>
-          <p:cNvSpPr txBox="1"/>
-          <p:nvPr>
-            <p:ph idx="1" type="body"/>
-          </p:nvPr>
-        </p:nvSpPr>
-        <p:spPr>
-          <a:xfrm>
-            <a:off x="274320" y="914400"/>
-            <a:ext cx="8595300" cy="4114800"/>
-          </a:xfrm>
-          <a:prstGeom prst="rect">
-            <a:avLst/>
-          </a:prstGeom>
-        </p:spPr>
-        <p:txBody>
-          <a:bodyPr anchorCtr="0" anchor="t" bIns="0" lIns="0" spcFirstLastPara="1" rIns="0" wrap="square" tIns="0">
-            <a:noAutofit/>
-          </a:bodyPr>
-          <a:lstStyle/>
-          <a:p>
-            <a:pPr indent="0" lvl="0" marL="0" rtl="0" algn="l">
-              <a:spcBef>
-                <a:spcPts val="0"/>
-              </a:spcBef>
-              <a:spcAft>
-                <a:spcPts val="0"/>
-              </a:spcAft>
-              <a:buNone/>
-            </a:pPr>
-            <a:r>
-              <a:rPr lang="en"/>
-              <a:t>A class should be open for extension and closed for modification</a:t>
-            </a:r>
-            <a:endParaRPr/>
-          </a:p>
-          <a:p>
-            <a:pPr indent="0" lvl="0" marL="0" rtl="0" algn="l">
-              <a:spcBef>
-                <a:spcPts val="1200"/>
-              </a:spcBef>
-              <a:spcAft>
-                <a:spcPts val="0"/>
-              </a:spcAft>
-              <a:buNone/>
-            </a:pPr>
-            <a:r>
-              <a:rPr lang="en"/>
-              <a:t>Open for extension through a well-defined inheritance interface</a:t>
-            </a:r>
-            <a:endParaRPr/>
-          </a:p>
-          <a:p>
-            <a:pPr indent="0" lvl="0" marL="0" rtl="0" algn="l">
-              <a:spcBef>
-                <a:spcPts val="1200"/>
-              </a:spcBef>
-              <a:spcAft>
-                <a:spcPts val="1200"/>
-              </a:spcAft>
-              <a:buNone/>
-            </a:pPr>
-            <a:r>
-              <a:rPr lang="en"/>
-              <a:t>Closed for modification by not violating the use-client interface</a:t>
-            </a:r>
-            <a:endParaRPr/>
-          </a:p>
-        </p:txBody>
-      </p:sp>
-      <p:sp>
-        <p:nvSpPr>
-          <p:cNvPr id="307" name="Google Shape;307;p46"/>
+          <p:cNvPr id="308" name="Google Shape;308;p46"/>
           <p:cNvSpPr txBox="1"/>
           <p:nvPr>
             <p:ph idx="12" type="sldNum"/>
@@ -26615,7 +26779,7 @@
   <p:cSld>
     <p:spTree>
       <p:nvGrpSpPr>
-        <p:cNvPr id="311" name="Shape 311"/>
+        <p:cNvPr id="312" name="Shape 312"/>
         <p:cNvGrpSpPr/>
         <p:nvPr/>
       </p:nvGrpSpPr>
@@ -26629,7 +26793,217 @@
       </p:grpSpPr>
       <p:sp>
         <p:nvSpPr>
-          <p:cNvPr id="312" name="Google Shape;312;p47"/>
+          <p:cNvPr id="313" name="Google Shape;313;p47"/>
+          <p:cNvSpPr txBox="1"/>
+          <p:nvPr>
+            <p:ph type="title"/>
+          </p:nvPr>
+        </p:nvSpPr>
+        <p:spPr>
+          <a:xfrm>
+            <a:off x="0" y="0"/>
+            <a:ext cx="9144000" cy="685800"/>
+          </a:xfrm>
+          <a:prstGeom prst="rect">
+            <a:avLst/>
+          </a:prstGeom>
+        </p:spPr>
+        <p:txBody>
+          <a:bodyPr anchorCtr="0" anchor="ctr" bIns="91425" lIns="274300" spcFirstLastPara="1" rIns="91425" wrap="square" tIns="91425">
+            <a:noAutofit/>
+          </a:bodyPr>
+          <a:lstStyle/>
+          <a:p>
+            <a:pPr indent="0" lvl="0" marL="0" rtl="0" algn="l">
+              <a:spcBef>
+                <a:spcPts val="0"/>
+              </a:spcBef>
+              <a:spcAft>
+                <a:spcPts val="0"/>
+              </a:spcAft>
+              <a:buNone/>
+            </a:pPr>
+            <a:r>
+              <a:rPr lang="en"/>
+              <a:t>The Open / Closed Principle</a:t>
+            </a:r>
+            <a:endParaRPr/>
+          </a:p>
+        </p:txBody>
+      </p:sp>
+      <p:sp>
+        <p:nvSpPr>
+          <p:cNvPr id="314" name="Google Shape;314;p47"/>
+          <p:cNvSpPr txBox="1"/>
+          <p:nvPr>
+            <p:ph idx="1" type="body"/>
+          </p:nvPr>
+        </p:nvSpPr>
+        <p:spPr>
+          <a:xfrm>
+            <a:off x="274320" y="914400"/>
+            <a:ext cx="8595300" cy="4114800"/>
+          </a:xfrm>
+          <a:prstGeom prst="rect">
+            <a:avLst/>
+          </a:prstGeom>
+        </p:spPr>
+        <p:txBody>
+          <a:bodyPr anchorCtr="0" anchor="t" bIns="0" lIns="0" spcFirstLastPara="1" rIns="0" wrap="square" tIns="0">
+            <a:noAutofit/>
+          </a:bodyPr>
+          <a:lstStyle/>
+          <a:p>
+            <a:pPr indent="0" lvl="0" marL="0" rtl="0" algn="l">
+              <a:spcBef>
+                <a:spcPts val="0"/>
+              </a:spcBef>
+              <a:spcAft>
+                <a:spcPts val="0"/>
+              </a:spcAft>
+              <a:buNone/>
+            </a:pPr>
+            <a:r>
+              <a:rPr lang="en"/>
+              <a:t>A class should be open for extension and closed for modification</a:t>
+            </a:r>
+            <a:endParaRPr/>
+          </a:p>
+          <a:p>
+            <a:pPr indent="0" lvl="0" marL="0" rtl="0" algn="l">
+              <a:spcBef>
+                <a:spcPts val="1200"/>
+              </a:spcBef>
+              <a:spcAft>
+                <a:spcPts val="0"/>
+              </a:spcAft>
+              <a:buNone/>
+            </a:pPr>
+            <a:r>
+              <a:rPr lang="en"/>
+              <a:t>Open for extension through a well-defined inheritance interface</a:t>
+            </a:r>
+            <a:endParaRPr/>
+          </a:p>
+          <a:p>
+            <a:pPr indent="0" lvl="0" marL="0" rtl="0" algn="l">
+              <a:spcBef>
+                <a:spcPts val="1200"/>
+              </a:spcBef>
+              <a:spcAft>
+                <a:spcPts val="1200"/>
+              </a:spcAft>
+              <a:buNone/>
+            </a:pPr>
+            <a:r>
+              <a:rPr lang="en"/>
+              <a:t>Closed for modification by not violating the use-client interface</a:t>
+            </a:r>
+            <a:endParaRPr/>
+          </a:p>
+        </p:txBody>
+      </p:sp>
+      <p:sp>
+        <p:nvSpPr>
+          <p:cNvPr id="315" name="Google Shape;315;p47"/>
+          <p:cNvSpPr txBox="1"/>
+          <p:nvPr>
+            <p:ph idx="12" type="sldNum"/>
+          </p:nvPr>
+        </p:nvSpPr>
+        <p:spPr>
+          <a:xfrm>
+            <a:off x="7315202" y="4416550"/>
+            <a:ext cx="1828800" cy="731400"/>
+          </a:xfrm>
+          <a:prstGeom prst="rect">
+            <a:avLst/>
+          </a:prstGeom>
+        </p:spPr>
+        <p:txBody>
+          <a:bodyPr anchorCtr="0" anchor="b" bIns="91425" lIns="91425" spcFirstLastPara="1" rIns="91425" wrap="square" tIns="91425">
+            <a:noAutofit/>
+          </a:bodyPr>
+          <a:lstStyle/>
+          <a:p>
+            <a:pPr indent="0" lvl="0" marL="0" rtl="0" algn="r">
+              <a:spcBef>
+                <a:spcPts val="0"/>
+              </a:spcBef>
+              <a:spcAft>
+                <a:spcPts val="0"/>
+              </a:spcAft>
+              <a:buNone/>
+            </a:pPr>
+            <a:fld id="{00000000-1234-1234-1234-123412341234}" type="slidenum">
+              <a:rPr lang="en"/>
+              <a:t>‹#›</a:t>
+            </a:fld>
+            <a:endParaRPr/>
+          </a:p>
+          <a:p>
+            <a:pPr indent="0" lvl="0" marL="0" rtl="0" algn="r">
+              <a:spcBef>
+                <a:spcPts val="0"/>
+              </a:spcBef>
+              <a:spcAft>
+                <a:spcPts val="0"/>
+              </a:spcAft>
+              <a:buNone/>
+            </a:pPr>
+            <a:r>
+              <a:rPr b="0" lang="en" sz="900" u="sng">
+                <a:solidFill>
+                  <a:schemeClr val="hlink"/>
+                </a:solidFill>
+                <a:hlinkClick r:id="rId3"/>
+              </a:rPr>
+              <a:t>https://oss.cs.fau.de</a:t>
+            </a:r>
+            <a:r>
+              <a:rPr b="0" lang="en" sz="900">
+                <a:solidFill>
+                  <a:schemeClr val="dk2"/>
+                </a:solidFill>
+              </a:rPr>
+              <a:t> </a:t>
+            </a:r>
+            <a:endParaRPr b="0" sz="900">
+              <a:solidFill>
+                <a:schemeClr val="dk2"/>
+              </a:solidFill>
+            </a:endParaRPr>
+          </a:p>
+        </p:txBody>
+      </p:sp>
+    </p:spTree>
+  </p:cSld>
+  <p:clrMapOvr>
+    <a:masterClrMapping/>
+  </p:clrMapOvr>
+</p:sld>
+</file>
+
+<file path=ppt/slides/slide41.xml><?xml version="1.0" encoding="utf-8"?>
+<p:sld xmlns:a="http://schemas.openxmlformats.org/drawingml/2006/main" xmlns:r="http://schemas.openxmlformats.org/officeDocument/2006/relationships" xmlns:mc="http://schemas.openxmlformats.org/markup-compatibility/2006" xmlns:mv="urn:schemas-microsoft-com:mac:vml" xmlns:p="http://schemas.openxmlformats.org/presentationml/2006/main" xmlns:c="http://schemas.openxmlformats.org/drawingml/2006/chart" xmlns:dgm="http://schemas.openxmlformats.org/drawingml/2006/diagram" xmlns:o="urn:schemas-microsoft-com:office:office" xmlns:v="urn:schemas-microsoft-com:vml" xmlns:pvml="urn:schemas-microsoft-com:office:powerpoint" xmlns:com="http://schemas.openxmlformats.org/drawingml/2006/compatibility" xmlns:p14="http://schemas.microsoft.com/office/powerpoint/2010/main" xmlns:p15="http://schemas.microsoft.com/office/powerpoint/2012/main" xmlns:ahyp="http://schemas.microsoft.com/office/drawing/2018/hyperlinkcolor">
+  <p:cSld>
+    <p:spTree>
+      <p:nvGrpSpPr>
+        <p:cNvPr id="319" name="Shape 319"/>
+        <p:cNvGrpSpPr/>
+        <p:nvPr/>
+      </p:nvGrpSpPr>
+      <p:grpSpPr>
+        <a:xfrm>
+          <a:off x="0" y="0"/>
+          <a:ext cx="0" cy="0"/>
+          <a:chOff x="0" y="0"/>
+          <a:chExt cx="0" cy="0"/>
+        </a:xfrm>
+      </p:grpSpPr>
+      <p:sp>
+        <p:nvSpPr>
+          <p:cNvPr id="320" name="Google Shape;320;p48"/>
           <p:cNvSpPr txBox="1"/>
           <p:nvPr>
             <p:ph type="title"/>
@@ -26675,12 +27049,12 @@
 </p:sld>
 </file>
 
-<file path=ppt/slides/slide41.xml><?xml version="1.0" encoding="utf-8"?>
+<file path=ppt/slides/slide42.xml><?xml version="1.0" encoding="utf-8"?>
 <p:sld xmlns:a="http://schemas.openxmlformats.org/drawingml/2006/main" xmlns:r="http://schemas.openxmlformats.org/officeDocument/2006/relationships" xmlns:mc="http://schemas.openxmlformats.org/markup-compatibility/2006" xmlns:mv="urn:schemas-microsoft-com:mac:vml" xmlns:p="http://schemas.openxmlformats.org/presentationml/2006/main" xmlns:c="http://schemas.openxmlformats.org/drawingml/2006/chart" xmlns:dgm="http://schemas.openxmlformats.org/drawingml/2006/diagram" xmlns:o="urn:schemas-microsoft-com:office:office" xmlns:v="urn:schemas-microsoft-com:vml" xmlns:pvml="urn:schemas-microsoft-com:office:powerpoint" xmlns:com="http://schemas.openxmlformats.org/drawingml/2006/compatibility" xmlns:p14="http://schemas.microsoft.com/office/powerpoint/2010/main" xmlns:p15="http://schemas.microsoft.com/office/powerpoint/2012/main" xmlns:ahyp="http://schemas.microsoft.com/office/drawing/2018/hyperlinkcolor">
   <p:cSld>
     <p:spTree>
       <p:nvGrpSpPr>
-        <p:cNvPr id="316" name="Shape 316"/>
+        <p:cNvPr id="324" name="Shape 324"/>
         <p:cNvGrpSpPr/>
         <p:nvPr/>
       </p:nvGrpSpPr>
@@ -26694,7 +27068,7 @@
       </p:grpSpPr>
       <p:sp>
         <p:nvSpPr>
-          <p:cNvPr id="317" name="Google Shape;317;p48"/>
+          <p:cNvPr id="325" name="Google Shape;325;p49"/>
           <p:cNvSpPr txBox="1"/>
           <p:nvPr>
             <p:ph type="title"/>
@@ -26738,7 +27112,7 @@
       </p:sp>
       <p:sp>
         <p:nvSpPr>
-          <p:cNvPr id="318" name="Google Shape;318;p48"/>
+          <p:cNvPr id="326" name="Google Shape;326;p49"/>
           <p:cNvSpPr txBox="1"/>
           <p:nvPr>
             <p:ph idx="1" type="body"/>
@@ -26838,7 +27212,7 @@
       </p:sp>
       <p:sp>
         <p:nvSpPr>
-          <p:cNvPr id="319" name="Google Shape;319;p48"/>
+          <p:cNvPr id="327" name="Google Shape;327;p49"/>
           <p:cNvSpPr txBox="1"/>
           <p:nvPr>
             <p:ph idx="12" type="sldNum"/>
@@ -26917,12 +27291,12 @@
 </p:sld>
 </file>
 
-<file path=ppt/slides/slide42.xml><?xml version="1.0" encoding="utf-8"?>
+<file path=ppt/slides/slide43.xml><?xml version="1.0" encoding="utf-8"?>
 <p:sld xmlns:a="http://schemas.openxmlformats.org/drawingml/2006/main" xmlns:r="http://schemas.openxmlformats.org/officeDocument/2006/relationships" xmlns:mc="http://schemas.openxmlformats.org/markup-compatibility/2006" xmlns:mv="urn:schemas-microsoft-com:mac:vml" xmlns:p="http://schemas.openxmlformats.org/presentationml/2006/main" xmlns:c="http://schemas.openxmlformats.org/drawingml/2006/chart" xmlns:dgm="http://schemas.openxmlformats.org/drawingml/2006/diagram" xmlns:o="urn:schemas-microsoft-com:office:office" xmlns:v="urn:schemas-microsoft-com:vml" xmlns:pvml="urn:schemas-microsoft-com:office:powerpoint" xmlns:com="http://schemas.openxmlformats.org/drawingml/2006/compatibility" xmlns:p14="http://schemas.microsoft.com/office/powerpoint/2010/main" xmlns:p15="http://schemas.microsoft.com/office/powerpoint/2012/main" xmlns:ahyp="http://schemas.microsoft.com/office/drawing/2018/hyperlinkcolor">
   <p:cSld>
     <p:spTree>
       <p:nvGrpSpPr>
-        <p:cNvPr id="323" name="Shape 323"/>
+        <p:cNvPr id="331" name="Shape 331"/>
         <p:cNvGrpSpPr/>
         <p:nvPr/>
       </p:nvGrpSpPr>
@@ -26936,7 +27310,7 @@
       </p:grpSpPr>
       <p:sp>
         <p:nvSpPr>
-          <p:cNvPr id="324" name="Google Shape;324;p49"/>
+          <p:cNvPr id="332" name="Google Shape;332;p50"/>
           <p:cNvSpPr txBox="1"/>
           <p:nvPr>
             <p:ph type="title"/>
@@ -26976,7 +27350,7 @@
       </p:sp>
       <p:sp>
         <p:nvSpPr>
-          <p:cNvPr id="325" name="Google Shape;325;p49"/>
+          <p:cNvPr id="333" name="Google Shape;333;p50"/>
           <p:cNvSpPr txBox="1"/>
           <p:nvPr>
             <p:ph idx="12" type="sldNum"/>
@@ -27049,173 +27423,7 @@
       </p:sp>
       <p:pic>
         <p:nvPicPr>
-          <p:cNvPr id="326" name="Google Shape;326;p49"/>
-          <p:cNvPicPr preferRelativeResize="0"/>
-          <p:nvPr/>
-        </p:nvPicPr>
-        <p:blipFill>
-          <a:blip r:embed="rId4">
-            <a:alphaModFix/>
-          </a:blip>
-          <a:stretch>
-            <a:fillRect/>
-          </a:stretch>
-        </p:blipFill>
-        <p:spPr>
-          <a:xfrm>
-            <a:off x="274320" y="914400"/>
-            <a:ext cx="8595360" cy="3502840"/>
-          </a:xfrm>
-          <a:prstGeom prst="rect">
-            <a:avLst/>
-          </a:prstGeom>
-          <a:noFill/>
-          <a:ln>
-            <a:noFill/>
-          </a:ln>
-        </p:spPr>
-      </p:pic>
-    </p:spTree>
-  </p:cSld>
-  <p:clrMapOvr>
-    <a:masterClrMapping/>
-  </p:clrMapOvr>
-</p:sld>
-</file>
-
-<file path=ppt/slides/slide43.xml><?xml version="1.0" encoding="utf-8"?>
-<p:sld xmlns:a="http://schemas.openxmlformats.org/drawingml/2006/main" xmlns:r="http://schemas.openxmlformats.org/officeDocument/2006/relationships" xmlns:mc="http://schemas.openxmlformats.org/markup-compatibility/2006" xmlns:mv="urn:schemas-microsoft-com:mac:vml" xmlns:p="http://schemas.openxmlformats.org/presentationml/2006/main" xmlns:c="http://schemas.openxmlformats.org/drawingml/2006/chart" xmlns:dgm="http://schemas.openxmlformats.org/drawingml/2006/diagram" xmlns:o="urn:schemas-microsoft-com:office:office" xmlns:v="urn:schemas-microsoft-com:vml" xmlns:pvml="urn:schemas-microsoft-com:office:powerpoint" xmlns:com="http://schemas.openxmlformats.org/drawingml/2006/compatibility" xmlns:p14="http://schemas.microsoft.com/office/powerpoint/2010/main" xmlns:p15="http://schemas.microsoft.com/office/powerpoint/2012/main" xmlns:ahyp="http://schemas.microsoft.com/office/drawing/2018/hyperlinkcolor">
-  <p:cSld>
-    <p:spTree>
-      <p:nvGrpSpPr>
-        <p:cNvPr id="330" name="Shape 330"/>
-        <p:cNvGrpSpPr/>
-        <p:nvPr/>
-      </p:nvGrpSpPr>
-      <p:grpSpPr>
-        <a:xfrm>
-          <a:off x="0" y="0"/>
-          <a:ext cx="0" cy="0"/>
-          <a:chOff x="0" y="0"/>
-          <a:chExt cx="0" cy="0"/>
-        </a:xfrm>
-      </p:grpSpPr>
-      <p:sp>
-        <p:nvSpPr>
-          <p:cNvPr id="331" name="Google Shape;331;p50"/>
-          <p:cNvSpPr txBox="1"/>
-          <p:nvPr>
-            <p:ph type="title"/>
-          </p:nvPr>
-        </p:nvSpPr>
-        <p:spPr>
-          <a:xfrm>
-            <a:off x="0" y="0"/>
-            <a:ext cx="9144000" cy="685800"/>
-          </a:xfrm>
-          <a:prstGeom prst="rect">
-            <a:avLst/>
-          </a:prstGeom>
-        </p:spPr>
-        <p:txBody>
-          <a:bodyPr anchorCtr="0" anchor="ctr" bIns="0" lIns="274300" spcFirstLastPara="1" rIns="0" wrap="square" tIns="0">
-            <a:noAutofit/>
-          </a:bodyPr>
-          <a:lstStyle/>
-          <a:p>
-            <a:pPr indent="0" lvl="0" marL="0" rtl="0" algn="l">
-              <a:spcBef>
-                <a:spcPts val="0"/>
-              </a:spcBef>
-              <a:spcAft>
-                <a:spcPts val="0"/>
-              </a:spcAft>
-              <a:buNone/>
-            </a:pPr>
-            <a:r>
-              <a:rPr lang="en"/>
-              <a:t>2. Interface Extraction</a:t>
-            </a:r>
-            <a:endParaRPr/>
-          </a:p>
-        </p:txBody>
-      </p:sp>
-      <p:sp>
-        <p:nvSpPr>
-          <p:cNvPr id="332" name="Google Shape;332;p50"/>
-          <p:cNvSpPr txBox="1"/>
-          <p:nvPr>
-            <p:ph idx="12" type="sldNum"/>
-          </p:nvPr>
-        </p:nvSpPr>
-        <p:spPr>
-          <a:xfrm>
-            <a:off x="7315202" y="4416550"/>
-            <a:ext cx="1828800" cy="731400"/>
-          </a:xfrm>
-          <a:prstGeom prst="rect">
-            <a:avLst/>
-          </a:prstGeom>
-        </p:spPr>
-        <p:txBody>
-          <a:bodyPr anchorCtr="0" anchor="b" bIns="91425" lIns="91425" spcFirstLastPara="1" rIns="91425" wrap="square" tIns="91425">
-            <a:noAutofit/>
-          </a:bodyPr>
-          <a:lstStyle/>
-          <a:p>
-            <a:pPr indent="0" lvl="0" marL="0" rtl="0" algn="r">
-              <a:spcBef>
-                <a:spcPts val="0"/>
-              </a:spcBef>
-              <a:spcAft>
-                <a:spcPts val="0"/>
-              </a:spcAft>
-              <a:buNone/>
-            </a:pPr>
-            <a:fld id="{00000000-1234-1234-1234-123412341234}" type="slidenum">
-              <a:rPr lang="en"/>
-              <a:t>‹#›</a:t>
-            </a:fld>
-            <a:endParaRPr/>
-          </a:p>
-          <a:p>
-            <a:pPr indent="0" lvl="0" marL="0" rtl="0" algn="r">
-              <a:spcBef>
-                <a:spcPts val="0"/>
-              </a:spcBef>
-              <a:spcAft>
-                <a:spcPts val="0"/>
-              </a:spcAft>
-              <a:buNone/>
-            </a:pPr>
-            <a:r>
-              <a:rPr b="0" lang="en" sz="900" u="sng">
-                <a:solidFill>
-                  <a:schemeClr val="hlink"/>
-                </a:solidFill>
-                <a:hlinkClick r:id="rId3"/>
-              </a:rPr>
-              <a:t>https://oss.cs.fau.de</a:t>
-            </a:r>
-            <a:r>
-              <a:rPr b="0" lang="en" sz="900">
-                <a:solidFill>
-                  <a:schemeClr val="dk2"/>
-                </a:solidFill>
-              </a:rPr>
-              <a:t> </a:t>
-            </a:r>
-            <a:endParaRPr>
-              <a:solidFill>
-                <a:schemeClr val="dk2"/>
-              </a:solidFill>
-            </a:endParaRPr>
-          </a:p>
-        </p:txBody>
-      </p:sp>
-      <p:pic>
-        <p:nvPicPr>
-          <p:cNvPr id="333" name="Google Shape;333;p50"/>
+          <p:cNvPr id="334" name="Google Shape;334;p50"/>
           <p:cNvPicPr preferRelativeResize="0"/>
           <p:nvPr/>
         </p:nvPicPr>
@@ -27254,7 +27462,7 @@
   <p:cSld>
     <p:spTree>
       <p:nvGrpSpPr>
-        <p:cNvPr id="337" name="Shape 337"/>
+        <p:cNvPr id="338" name="Shape 338"/>
         <p:cNvGrpSpPr/>
         <p:nvPr/>
       </p:nvGrpSpPr>
@@ -27268,7 +27476,7 @@
       </p:grpSpPr>
       <p:sp>
         <p:nvSpPr>
-          <p:cNvPr id="338" name="Google Shape;338;p51"/>
+          <p:cNvPr id="339" name="Google Shape;339;p51"/>
           <p:cNvSpPr txBox="1"/>
           <p:nvPr>
             <p:ph type="title"/>
@@ -27300,7 +27508,7 @@
             </a:pPr>
             <a:r>
               <a:rPr lang="en"/>
-              <a:t>3. Addition of Implementation Classes </a:t>
+              <a:t>2. Interface Extraction</a:t>
             </a:r>
             <a:endParaRPr/>
           </a:p>
@@ -27308,7 +27516,7 @@
       </p:sp>
       <p:sp>
         <p:nvSpPr>
-          <p:cNvPr id="339" name="Google Shape;339;p51"/>
+          <p:cNvPr id="340" name="Google Shape;340;p51"/>
           <p:cNvSpPr txBox="1"/>
           <p:nvPr>
             <p:ph idx="12" type="sldNum"/>
@@ -27381,7 +27589,7 @@
       </p:sp>
       <p:pic>
         <p:nvPicPr>
-          <p:cNvPr id="340" name="Google Shape;340;p51"/>
+          <p:cNvPr id="341" name="Google Shape;341;p51"/>
           <p:cNvPicPr preferRelativeResize="0"/>
           <p:nvPr/>
         </p:nvPicPr>
@@ -27420,7 +27628,7 @@
   <p:cSld>
     <p:spTree>
       <p:nvGrpSpPr>
-        <p:cNvPr id="344" name="Shape 344"/>
+        <p:cNvPr id="345" name="Shape 345"/>
         <p:cNvGrpSpPr/>
         <p:nvPr/>
       </p:nvGrpSpPr>
@@ -27434,7 +27642,7 @@
       </p:grpSpPr>
       <p:sp>
         <p:nvSpPr>
-          <p:cNvPr id="345" name="Google Shape;345;p52"/>
+          <p:cNvPr id="346" name="Google Shape;346;p52"/>
           <p:cNvSpPr txBox="1"/>
           <p:nvPr>
             <p:ph type="title"/>
@@ -27466,7 +27674,7 @@
             </a:pPr>
             <a:r>
               <a:rPr lang="en"/>
-              <a:t>4. Introduction of Abstract Superclass</a:t>
+              <a:t>3. Addition of Implementation Classes </a:t>
             </a:r>
             <a:endParaRPr/>
           </a:p>
@@ -27474,7 +27682,7 @@
       </p:sp>
       <p:sp>
         <p:nvSpPr>
-          <p:cNvPr id="346" name="Google Shape;346;p52"/>
+          <p:cNvPr id="347" name="Google Shape;347;p52"/>
           <p:cNvSpPr txBox="1"/>
           <p:nvPr>
             <p:ph idx="12" type="sldNum"/>
@@ -27547,7 +27755,7 @@
       </p:sp>
       <p:pic>
         <p:nvPicPr>
-          <p:cNvPr id="347" name="Google Shape;347;p52"/>
+          <p:cNvPr id="348" name="Google Shape;348;p52"/>
           <p:cNvPicPr preferRelativeResize="0"/>
           <p:nvPr/>
         </p:nvPicPr>
@@ -27586,7 +27794,7 @@
   <p:cSld>
     <p:spTree>
       <p:nvGrpSpPr>
-        <p:cNvPr id="351" name="Shape 351"/>
+        <p:cNvPr id="352" name="Shape 352"/>
         <p:cNvGrpSpPr/>
         <p:nvPr/>
       </p:nvGrpSpPr>
@@ -27600,7 +27808,7 @@
       </p:grpSpPr>
       <p:sp>
         <p:nvSpPr>
-          <p:cNvPr id="352" name="Google Shape;352;p53"/>
+          <p:cNvPr id="353" name="Google Shape;353;p53"/>
           <p:cNvSpPr txBox="1"/>
           <p:nvPr>
             <p:ph type="title"/>
@@ -27632,7 +27840,7 @@
             </a:pPr>
             <a:r>
               <a:rPr lang="en"/>
-              <a:t>Naming Conventions of Classes [1]</a:t>
+              <a:t>4. Introduction of Abstract Superclass</a:t>
             </a:r>
             <a:endParaRPr/>
           </a:p>
@@ -27640,7 +27848,7 @@
       </p:sp>
       <p:sp>
         <p:nvSpPr>
-          <p:cNvPr id="353" name="Google Shape;353;p53"/>
+          <p:cNvPr id="354" name="Google Shape;354;p53"/>
           <p:cNvSpPr txBox="1"/>
           <p:nvPr>
             <p:ph idx="12" type="sldNum"/>
@@ -27684,6 +27892,172 @@
               <a:spcAft>
                 <a:spcPts val="0"/>
               </a:spcAft>
+              <a:buNone/>
+            </a:pPr>
+            <a:r>
+              <a:rPr b="0" lang="en" sz="900" u="sng">
+                <a:solidFill>
+                  <a:schemeClr val="hlink"/>
+                </a:solidFill>
+                <a:hlinkClick r:id="rId3"/>
+              </a:rPr>
+              <a:t>https://oss.cs.fau.de</a:t>
+            </a:r>
+            <a:r>
+              <a:rPr b="0" lang="en" sz="900">
+                <a:solidFill>
+                  <a:schemeClr val="dk2"/>
+                </a:solidFill>
+              </a:rPr>
+              <a:t> </a:t>
+            </a:r>
+            <a:endParaRPr>
+              <a:solidFill>
+                <a:schemeClr val="dk2"/>
+              </a:solidFill>
+            </a:endParaRPr>
+          </a:p>
+        </p:txBody>
+      </p:sp>
+      <p:pic>
+        <p:nvPicPr>
+          <p:cNvPr id="355" name="Google Shape;355;p53"/>
+          <p:cNvPicPr preferRelativeResize="0"/>
+          <p:nvPr/>
+        </p:nvPicPr>
+        <p:blipFill>
+          <a:blip r:embed="rId4">
+            <a:alphaModFix/>
+          </a:blip>
+          <a:stretch>
+            <a:fillRect/>
+          </a:stretch>
+        </p:blipFill>
+        <p:spPr>
+          <a:xfrm>
+            <a:off x="274320" y="914400"/>
+            <a:ext cx="8595360" cy="3502840"/>
+          </a:xfrm>
+          <a:prstGeom prst="rect">
+            <a:avLst/>
+          </a:prstGeom>
+          <a:noFill/>
+          <a:ln>
+            <a:noFill/>
+          </a:ln>
+        </p:spPr>
+      </p:pic>
+    </p:spTree>
+  </p:cSld>
+  <p:clrMapOvr>
+    <a:masterClrMapping/>
+  </p:clrMapOvr>
+</p:sld>
+</file>
+
+<file path=ppt/slides/slide47.xml><?xml version="1.0" encoding="utf-8"?>
+<p:sld xmlns:a="http://schemas.openxmlformats.org/drawingml/2006/main" xmlns:r="http://schemas.openxmlformats.org/officeDocument/2006/relationships" xmlns:mc="http://schemas.openxmlformats.org/markup-compatibility/2006" xmlns:mv="urn:schemas-microsoft-com:mac:vml" xmlns:p="http://schemas.openxmlformats.org/presentationml/2006/main" xmlns:c="http://schemas.openxmlformats.org/drawingml/2006/chart" xmlns:dgm="http://schemas.openxmlformats.org/drawingml/2006/diagram" xmlns:o="urn:schemas-microsoft-com:office:office" xmlns:v="urn:schemas-microsoft-com:vml" xmlns:pvml="urn:schemas-microsoft-com:office:powerpoint" xmlns:com="http://schemas.openxmlformats.org/drawingml/2006/compatibility" xmlns:p14="http://schemas.microsoft.com/office/powerpoint/2010/main" xmlns:p15="http://schemas.microsoft.com/office/powerpoint/2012/main" xmlns:ahyp="http://schemas.microsoft.com/office/drawing/2018/hyperlinkcolor">
+  <p:cSld>
+    <p:spTree>
+      <p:nvGrpSpPr>
+        <p:cNvPr id="359" name="Shape 359"/>
+        <p:cNvGrpSpPr/>
+        <p:nvPr/>
+      </p:nvGrpSpPr>
+      <p:grpSpPr>
+        <a:xfrm>
+          <a:off x="0" y="0"/>
+          <a:ext cx="0" cy="0"/>
+          <a:chOff x="0" y="0"/>
+          <a:chExt cx="0" cy="0"/>
+        </a:xfrm>
+      </p:grpSpPr>
+      <p:sp>
+        <p:nvSpPr>
+          <p:cNvPr id="360" name="Google Shape;360;p54"/>
+          <p:cNvSpPr txBox="1"/>
+          <p:nvPr>
+            <p:ph type="title"/>
+          </p:nvPr>
+        </p:nvSpPr>
+        <p:spPr>
+          <a:xfrm>
+            <a:off x="0" y="0"/>
+            <a:ext cx="9144000" cy="685800"/>
+          </a:xfrm>
+          <a:prstGeom prst="rect">
+            <a:avLst/>
+          </a:prstGeom>
+        </p:spPr>
+        <p:txBody>
+          <a:bodyPr anchorCtr="0" anchor="ctr" bIns="0" lIns="274300" spcFirstLastPara="1" rIns="0" wrap="square" tIns="0">
+            <a:noAutofit/>
+          </a:bodyPr>
+          <a:lstStyle/>
+          <a:p>
+            <a:pPr indent="0" lvl="0" marL="0" rtl="0" algn="l">
+              <a:spcBef>
+                <a:spcPts val="0"/>
+              </a:spcBef>
+              <a:spcAft>
+                <a:spcPts val="0"/>
+              </a:spcAft>
+              <a:buNone/>
+            </a:pPr>
+            <a:r>
+              <a:rPr lang="en"/>
+              <a:t>Naming Conventions of Classes [1]</a:t>
+            </a:r>
+            <a:endParaRPr/>
+          </a:p>
+        </p:txBody>
+      </p:sp>
+      <p:sp>
+        <p:nvSpPr>
+          <p:cNvPr id="361" name="Google Shape;361;p54"/>
+          <p:cNvSpPr txBox="1"/>
+          <p:nvPr>
+            <p:ph idx="12" type="sldNum"/>
+          </p:nvPr>
+        </p:nvSpPr>
+        <p:spPr>
+          <a:xfrm>
+            <a:off x="7315202" y="4416550"/>
+            <a:ext cx="1828800" cy="731400"/>
+          </a:xfrm>
+          <a:prstGeom prst="rect">
+            <a:avLst/>
+          </a:prstGeom>
+        </p:spPr>
+        <p:txBody>
+          <a:bodyPr anchorCtr="0" anchor="b" bIns="91425" lIns="91425" spcFirstLastPara="1" rIns="91425" wrap="square" tIns="91425">
+            <a:noAutofit/>
+          </a:bodyPr>
+          <a:lstStyle/>
+          <a:p>
+            <a:pPr indent="0" lvl="0" marL="0" rtl="0" algn="r">
+              <a:spcBef>
+                <a:spcPts val="0"/>
+              </a:spcBef>
+              <a:spcAft>
+                <a:spcPts val="0"/>
+              </a:spcAft>
+              <a:buNone/>
+            </a:pPr>
+            <a:fld id="{00000000-1234-1234-1234-123412341234}" type="slidenum">
+              <a:rPr lang="en"/>
+              <a:t>‹#›</a:t>
+            </a:fld>
+            <a:endParaRPr/>
+          </a:p>
+          <a:p>
+            <a:pPr indent="0" lvl="0" marL="0" rtl="0" algn="r">
+              <a:spcBef>
+                <a:spcPts val="0"/>
+              </a:spcBef>
+              <a:spcAft>
+                <a:spcPts val="0"/>
+              </a:spcAft>
               <a:buClr>
                 <a:schemeClr val="dk1"/>
               </a:buClr>
@@ -27710,7 +28084,7 @@
       </p:sp>
       <p:sp>
         <p:nvSpPr>
-          <p:cNvPr id="354" name="Google Shape;354;p53"/>
+          <p:cNvPr id="362" name="Google Shape;362;p54"/>
           <p:cNvSpPr txBox="1"/>
           <p:nvPr>
             <p:ph idx="1" type="body"/>
@@ -27903,7 +28277,7 @@
       </p:sp>
       <p:sp>
         <p:nvSpPr>
-          <p:cNvPr id="355" name="Google Shape;355;p53"/>
+          <p:cNvPr id="363" name="Google Shape;363;p54"/>
           <p:cNvSpPr txBox="1"/>
           <p:nvPr>
             <p:ph idx="2" type="body"/>
@@ -28062,7 +28436,7 @@
       </p:sp>
       <p:sp>
         <p:nvSpPr>
-          <p:cNvPr id="356" name="Google Shape;356;p53"/>
+          <p:cNvPr id="364" name="Google Shape;364;p54"/>
           <p:cNvSpPr txBox="1"/>
           <p:nvPr/>
         </p:nvSpPr>
@@ -28110,12 +28484,12 @@
 </p:sld>
 </file>
 
-<file path=ppt/slides/slide47.xml><?xml version="1.0" encoding="utf-8"?>
+<file path=ppt/slides/slide48.xml><?xml version="1.0" encoding="utf-8"?>
 <p:sld xmlns:a="http://schemas.openxmlformats.org/drawingml/2006/main" xmlns:r="http://schemas.openxmlformats.org/officeDocument/2006/relationships" xmlns:mc="http://schemas.openxmlformats.org/markup-compatibility/2006" xmlns:mv="urn:schemas-microsoft-com:mac:vml" xmlns:p="http://schemas.openxmlformats.org/presentationml/2006/main" xmlns:c="http://schemas.openxmlformats.org/drawingml/2006/chart" xmlns:dgm="http://schemas.openxmlformats.org/drawingml/2006/diagram" xmlns:o="urn:schemas-microsoft-com:office:office" xmlns:v="urn:schemas-microsoft-com:vml" xmlns:pvml="urn:schemas-microsoft-com:office:powerpoint" xmlns:com="http://schemas.openxmlformats.org/drawingml/2006/compatibility" xmlns:p14="http://schemas.microsoft.com/office/powerpoint/2010/main" xmlns:p15="http://schemas.microsoft.com/office/powerpoint/2012/main" xmlns:ahyp="http://schemas.microsoft.com/office/drawing/2018/hyperlinkcolor">
   <p:cSld>
     <p:spTree>
       <p:nvGrpSpPr>
-        <p:cNvPr id="360" name="Shape 360"/>
+        <p:cNvPr id="368" name="Shape 368"/>
         <p:cNvGrpSpPr/>
         <p:nvPr/>
       </p:nvGrpSpPr>
@@ -28129,7 +28503,7 @@
       </p:grpSpPr>
       <p:sp>
         <p:nvSpPr>
-          <p:cNvPr id="361" name="Google Shape;361;p54"/>
+          <p:cNvPr id="369" name="Google Shape;369;p55"/>
           <p:cNvSpPr txBox="1"/>
           <p:nvPr>
             <p:ph type="title"/>
@@ -28169,7 +28543,7 @@
       </p:sp>
       <p:sp>
         <p:nvSpPr>
-          <p:cNvPr id="362" name="Google Shape;362;p54"/>
+          <p:cNvPr id="370" name="Google Shape;370;p55"/>
           <p:cNvSpPr txBox="1"/>
           <p:nvPr>
             <p:ph idx="1" type="body"/>
@@ -28325,7 +28699,7 @@
       </p:sp>
       <p:sp>
         <p:nvSpPr>
-          <p:cNvPr id="363" name="Google Shape;363;p54"/>
+          <p:cNvPr id="371" name="Google Shape;371;p55"/>
           <p:cNvSpPr txBox="1"/>
           <p:nvPr>
             <p:ph idx="12" type="sldNum"/>
@@ -28404,12 +28778,12 @@
 </p:sld>
 </file>
 
-<file path=ppt/slides/slide48.xml><?xml version="1.0" encoding="utf-8"?>
+<file path=ppt/slides/slide49.xml><?xml version="1.0" encoding="utf-8"?>
 <p:sld xmlns:a="http://schemas.openxmlformats.org/drawingml/2006/main" xmlns:r="http://schemas.openxmlformats.org/officeDocument/2006/relationships" xmlns:mc="http://schemas.openxmlformats.org/markup-compatibility/2006" xmlns:mv="urn:schemas-microsoft-com:mac:vml" xmlns:p="http://schemas.openxmlformats.org/presentationml/2006/main" xmlns:c="http://schemas.openxmlformats.org/drawingml/2006/chart" xmlns:dgm="http://schemas.openxmlformats.org/drawingml/2006/diagram" xmlns:o="urn:schemas-microsoft-com:office:office" xmlns:v="urn:schemas-microsoft-com:vml" xmlns:pvml="urn:schemas-microsoft-com:office:powerpoint" xmlns:com="http://schemas.openxmlformats.org/drawingml/2006/compatibility" xmlns:p14="http://schemas.microsoft.com/office/powerpoint/2010/main" xmlns:p15="http://schemas.microsoft.com/office/powerpoint/2012/main" xmlns:ahyp="http://schemas.microsoft.com/office/drawing/2018/hyperlinkcolor">
   <p:cSld>
     <p:spTree>
       <p:nvGrpSpPr>
-        <p:cNvPr id="367" name="Shape 367"/>
+        <p:cNvPr id="375" name="Shape 375"/>
         <p:cNvGrpSpPr/>
         <p:nvPr/>
       </p:nvGrpSpPr>
@@ -28423,7 +28797,7 @@
       </p:grpSpPr>
       <p:sp>
         <p:nvSpPr>
-          <p:cNvPr id="368" name="Google Shape;368;p55"/>
+          <p:cNvPr id="376" name="Google Shape;376;p56"/>
           <p:cNvSpPr txBox="1"/>
           <p:nvPr>
             <p:ph type="title"/>
@@ -28463,7 +28837,7 @@
       </p:sp>
       <p:sp>
         <p:nvSpPr>
-          <p:cNvPr id="369" name="Google Shape;369;p55"/>
+          <p:cNvPr id="377" name="Google Shape;377;p56"/>
           <p:cNvSpPr txBox="1"/>
           <p:nvPr>
             <p:ph idx="1" type="body"/>
@@ -28641,7 +29015,7 @@
       </p:sp>
       <p:sp>
         <p:nvSpPr>
-          <p:cNvPr id="370" name="Google Shape;370;p55"/>
+          <p:cNvPr id="378" name="Google Shape;378;p56"/>
           <p:cNvSpPr txBox="1"/>
           <p:nvPr>
             <p:ph idx="12" type="sldNum"/>
@@ -28709,190 +29083,6 @@
                 <a:schemeClr val="dk2"/>
               </a:solidFill>
             </a:endParaRPr>
-          </a:p>
-        </p:txBody>
-      </p:sp>
-    </p:spTree>
-  </p:cSld>
-  <p:clrMapOvr>
-    <a:masterClrMapping/>
-  </p:clrMapOvr>
-</p:sld>
-</file>
-
-<file path=ppt/slides/slide49.xml><?xml version="1.0" encoding="utf-8"?>
-<p:sld xmlns:a="http://schemas.openxmlformats.org/drawingml/2006/main" xmlns:r="http://schemas.openxmlformats.org/officeDocument/2006/relationships" xmlns:mc="http://schemas.openxmlformats.org/markup-compatibility/2006" xmlns:mv="urn:schemas-microsoft-com:mac:vml" xmlns:p="http://schemas.openxmlformats.org/presentationml/2006/main" xmlns:c="http://schemas.openxmlformats.org/drawingml/2006/chart" xmlns:dgm="http://schemas.openxmlformats.org/drawingml/2006/diagram" xmlns:o="urn:schemas-microsoft-com:office:office" xmlns:v="urn:schemas-microsoft-com:vml" xmlns:pvml="urn:schemas-microsoft-com:office:powerpoint" xmlns:com="http://schemas.openxmlformats.org/drawingml/2006/compatibility" xmlns:p14="http://schemas.microsoft.com/office/powerpoint/2010/main" xmlns:p15="http://schemas.microsoft.com/office/powerpoint/2012/main" xmlns:ahyp="http://schemas.microsoft.com/office/drawing/2018/hyperlinkcolor">
-  <p:cSld>
-    <p:spTree>
-      <p:nvGrpSpPr>
-        <p:cNvPr id="374" name="Shape 374"/>
-        <p:cNvGrpSpPr/>
-        <p:nvPr/>
-      </p:nvGrpSpPr>
-      <p:grpSpPr>
-        <a:xfrm>
-          <a:off x="0" y="0"/>
-          <a:ext cx="0" cy="0"/>
-          <a:chOff x="0" y="0"/>
-          <a:chExt cx="0" cy="0"/>
-        </a:xfrm>
-      </p:grpSpPr>
-      <p:sp>
-        <p:nvSpPr>
-          <p:cNvPr id="375" name="Google Shape;375;p56"/>
-          <p:cNvSpPr txBox="1"/>
-          <p:nvPr>
-            <p:ph type="ctrTitle"/>
-          </p:nvPr>
-        </p:nvSpPr>
-        <p:spPr>
-          <a:xfrm>
-            <a:off x="0" y="0"/>
-            <a:ext cx="9144000" cy="2388900"/>
-          </a:xfrm>
-          <a:prstGeom prst="rect">
-            <a:avLst/>
-          </a:prstGeom>
-        </p:spPr>
-        <p:txBody>
-          <a:bodyPr anchorCtr="0" anchor="b" bIns="274300" lIns="91425" spcFirstLastPara="1" rIns="91425" wrap="square" tIns="91425">
-            <a:noAutofit/>
-          </a:bodyPr>
-          <a:lstStyle/>
-          <a:p>
-            <a:pPr indent="0" lvl="0" marL="0" rtl="0" algn="ctr">
-              <a:spcBef>
-                <a:spcPts val="0"/>
-              </a:spcBef>
-              <a:spcAft>
-                <a:spcPts val="0"/>
-              </a:spcAft>
-              <a:buNone/>
-            </a:pPr>
-            <a:r>
-              <a:rPr lang="en"/>
-              <a:t>Thank you! Any questions?</a:t>
-            </a:r>
-            <a:endParaRPr/>
-          </a:p>
-        </p:txBody>
-      </p:sp>
-      <p:sp>
-        <p:nvSpPr>
-          <p:cNvPr id="376" name="Google Shape;376;p56"/>
-          <p:cNvSpPr txBox="1"/>
-          <p:nvPr>
-            <p:ph idx="1" type="subTitle"/>
-          </p:nvPr>
-        </p:nvSpPr>
-        <p:spPr>
-          <a:xfrm>
-            <a:off x="0" y="2569475"/>
-            <a:ext cx="9144000" cy="2574000"/>
-          </a:xfrm>
-          <a:prstGeom prst="rect">
-            <a:avLst/>
-          </a:prstGeom>
-        </p:spPr>
-        <p:txBody>
-          <a:bodyPr anchorCtr="0" anchor="t" bIns="91425" lIns="91425" spcFirstLastPara="1" rIns="91425" wrap="square" tIns="274300">
-            <a:noAutofit/>
-          </a:bodyPr>
-          <a:lstStyle/>
-          <a:p>
-            <a:pPr indent="0" lvl="0" marL="0" rtl="0" algn="ctr">
-              <a:lnSpc>
-                <a:spcPct val="150000"/>
-              </a:lnSpc>
-              <a:spcBef>
-                <a:spcPts val="0"/>
-              </a:spcBef>
-              <a:spcAft>
-                <a:spcPts val="0"/>
-              </a:spcAft>
-              <a:buNone/>
-            </a:pPr>
-            <a:r>
-              <a:rPr lang="en" u="sng">
-                <a:solidFill>
-                  <a:schemeClr val="hlink"/>
-                </a:solidFill>
-                <a:hlinkClick r:id="rId3"/>
-              </a:rPr>
-              <a:t>dirk.riehle@fau.de</a:t>
-            </a:r>
-            <a:r>
-              <a:rPr lang="en"/>
-              <a:t> </a:t>
-            </a:r>
-            <a:r>
-              <a:rPr lang="en" sz="2400"/>
-              <a:t>–</a:t>
-            </a:r>
-            <a:r>
-              <a:rPr lang="en"/>
-              <a:t> </a:t>
-            </a:r>
-            <a:r>
-              <a:rPr lang="en" u="sng">
-                <a:solidFill>
-                  <a:schemeClr val="hlink"/>
-                </a:solidFill>
-                <a:hlinkClick r:id="rId4"/>
-              </a:rPr>
-              <a:t>https://oss.cs.fau.de</a:t>
-            </a:r>
-            <a:endParaRPr/>
-          </a:p>
-          <a:p>
-            <a:pPr indent="0" lvl="0" marL="0" rtl="0" algn="ctr">
-              <a:lnSpc>
-                <a:spcPct val="150000"/>
-              </a:lnSpc>
-              <a:spcBef>
-                <a:spcPts val="0"/>
-              </a:spcBef>
-              <a:spcAft>
-                <a:spcPts val="0"/>
-              </a:spcAft>
-              <a:buNone/>
-            </a:pPr>
-            <a:r>
-              <a:rPr lang="en" sz="2400" u="sng">
-                <a:solidFill>
-                  <a:schemeClr val="hlink"/>
-                </a:solidFill>
-                <a:hlinkClick r:id="rId5"/>
-              </a:rPr>
-              <a:t>dirk@riehle.org</a:t>
-            </a:r>
-            <a:r>
-              <a:rPr lang="en" sz="2400"/>
-              <a:t> – </a:t>
-            </a:r>
-            <a:r>
-              <a:rPr lang="en" sz="2400" u="sng">
-                <a:solidFill>
-                  <a:schemeClr val="hlink"/>
-                </a:solidFill>
-                <a:hlinkClick r:id="rId6"/>
-              </a:rPr>
-              <a:t>https://dirkriehle.com</a:t>
-            </a:r>
-            <a:r>
-              <a:rPr lang="en" sz="2400"/>
-              <a:t> – </a:t>
-            </a:r>
-            <a:r>
-              <a:rPr lang="en" sz="2400" u="sng">
-                <a:solidFill>
-                  <a:schemeClr val="hlink"/>
-                </a:solidFill>
-                <a:hlinkClick r:id="rId7"/>
-              </a:rPr>
-              <a:t>@dirkriehle</a:t>
-            </a:r>
-            <a:endParaRPr sz="2400"/>
           </a:p>
         </p:txBody>
       </p:sp>
@@ -29224,7 +29414,7 @@
   <p:cSld>
     <p:spTree>
       <p:nvGrpSpPr>
-        <p:cNvPr id="380" name="Shape 380"/>
+        <p:cNvPr id="382" name="Shape 382"/>
         <p:cNvGrpSpPr/>
         <p:nvPr/>
       </p:nvGrpSpPr>
@@ -29238,7 +29428,191 @@
       </p:grpSpPr>
       <p:sp>
         <p:nvSpPr>
-          <p:cNvPr id="381" name="Google Shape;381;p57"/>
+          <p:cNvPr id="383" name="Google Shape;383;p57"/>
+          <p:cNvSpPr txBox="1"/>
+          <p:nvPr>
+            <p:ph type="ctrTitle"/>
+          </p:nvPr>
+        </p:nvSpPr>
+        <p:spPr>
+          <a:xfrm>
+            <a:off x="0" y="0"/>
+            <a:ext cx="9144000" cy="2388900"/>
+          </a:xfrm>
+          <a:prstGeom prst="rect">
+            <a:avLst/>
+          </a:prstGeom>
+        </p:spPr>
+        <p:txBody>
+          <a:bodyPr anchorCtr="0" anchor="b" bIns="274300" lIns="91425" spcFirstLastPara="1" rIns="91425" wrap="square" tIns="91425">
+            <a:noAutofit/>
+          </a:bodyPr>
+          <a:lstStyle/>
+          <a:p>
+            <a:pPr indent="0" lvl="0" marL="0" rtl="0" algn="ctr">
+              <a:spcBef>
+                <a:spcPts val="0"/>
+              </a:spcBef>
+              <a:spcAft>
+                <a:spcPts val="0"/>
+              </a:spcAft>
+              <a:buNone/>
+            </a:pPr>
+            <a:r>
+              <a:rPr lang="en"/>
+              <a:t>Thank you! Any questions?</a:t>
+            </a:r>
+            <a:endParaRPr/>
+          </a:p>
+        </p:txBody>
+      </p:sp>
+      <p:sp>
+        <p:nvSpPr>
+          <p:cNvPr id="384" name="Google Shape;384;p57"/>
+          <p:cNvSpPr txBox="1"/>
+          <p:nvPr>
+            <p:ph idx="1" type="subTitle"/>
+          </p:nvPr>
+        </p:nvSpPr>
+        <p:spPr>
+          <a:xfrm>
+            <a:off x="0" y="2569475"/>
+            <a:ext cx="9144000" cy="2574000"/>
+          </a:xfrm>
+          <a:prstGeom prst="rect">
+            <a:avLst/>
+          </a:prstGeom>
+        </p:spPr>
+        <p:txBody>
+          <a:bodyPr anchorCtr="0" anchor="t" bIns="91425" lIns="91425" spcFirstLastPara="1" rIns="91425" wrap="square" tIns="274300">
+            <a:noAutofit/>
+          </a:bodyPr>
+          <a:lstStyle/>
+          <a:p>
+            <a:pPr indent="0" lvl="0" marL="0" rtl="0" algn="ctr">
+              <a:lnSpc>
+                <a:spcPct val="150000"/>
+              </a:lnSpc>
+              <a:spcBef>
+                <a:spcPts val="0"/>
+              </a:spcBef>
+              <a:spcAft>
+                <a:spcPts val="0"/>
+              </a:spcAft>
+              <a:buNone/>
+            </a:pPr>
+            <a:r>
+              <a:rPr lang="en" u="sng">
+                <a:solidFill>
+                  <a:schemeClr val="hlink"/>
+                </a:solidFill>
+                <a:hlinkClick r:id="rId3"/>
+              </a:rPr>
+              <a:t>dirk.riehle@fau.de</a:t>
+            </a:r>
+            <a:r>
+              <a:rPr lang="en"/>
+              <a:t> </a:t>
+            </a:r>
+            <a:r>
+              <a:rPr lang="en" sz="2400"/>
+              <a:t>–</a:t>
+            </a:r>
+            <a:r>
+              <a:rPr lang="en"/>
+              <a:t> </a:t>
+            </a:r>
+            <a:r>
+              <a:rPr lang="en" u="sng">
+                <a:solidFill>
+                  <a:schemeClr val="hlink"/>
+                </a:solidFill>
+                <a:hlinkClick r:id="rId4"/>
+              </a:rPr>
+              <a:t>https://oss.cs.fau.de</a:t>
+            </a:r>
+            <a:endParaRPr/>
+          </a:p>
+          <a:p>
+            <a:pPr indent="0" lvl="0" marL="0" rtl="0" algn="ctr">
+              <a:lnSpc>
+                <a:spcPct val="150000"/>
+              </a:lnSpc>
+              <a:spcBef>
+                <a:spcPts val="0"/>
+              </a:spcBef>
+              <a:spcAft>
+                <a:spcPts val="0"/>
+              </a:spcAft>
+              <a:buNone/>
+            </a:pPr>
+            <a:r>
+              <a:rPr lang="en" sz="2400" u="sng">
+                <a:solidFill>
+                  <a:schemeClr val="hlink"/>
+                </a:solidFill>
+                <a:hlinkClick r:id="rId5"/>
+              </a:rPr>
+              <a:t>dirk@riehle.org</a:t>
+            </a:r>
+            <a:r>
+              <a:rPr lang="en" sz="2400"/>
+              <a:t> – </a:t>
+            </a:r>
+            <a:r>
+              <a:rPr lang="en" sz="2400" u="sng">
+                <a:solidFill>
+                  <a:schemeClr val="hlink"/>
+                </a:solidFill>
+                <a:hlinkClick r:id="rId6"/>
+              </a:rPr>
+              <a:t>https://dirkriehle.com</a:t>
+            </a:r>
+            <a:r>
+              <a:rPr lang="en" sz="2400"/>
+              <a:t> – </a:t>
+            </a:r>
+            <a:r>
+              <a:rPr lang="en" sz="2400" u="sng">
+                <a:solidFill>
+                  <a:schemeClr val="hlink"/>
+                </a:solidFill>
+                <a:hlinkClick r:id="rId7"/>
+              </a:rPr>
+              <a:t>@dirkriehle</a:t>
+            </a:r>
+            <a:endParaRPr sz="2400"/>
+          </a:p>
+        </p:txBody>
+      </p:sp>
+    </p:spTree>
+  </p:cSld>
+  <p:clrMapOvr>
+    <a:masterClrMapping/>
+  </p:clrMapOvr>
+</p:sld>
+</file>
+
+<file path=ppt/slides/slide51.xml><?xml version="1.0" encoding="utf-8"?>
+<p:sld xmlns:a="http://schemas.openxmlformats.org/drawingml/2006/main" xmlns:r="http://schemas.openxmlformats.org/officeDocument/2006/relationships" xmlns:mc="http://schemas.openxmlformats.org/markup-compatibility/2006" xmlns:mv="urn:schemas-microsoft-com:mac:vml" xmlns:p="http://schemas.openxmlformats.org/presentationml/2006/main" xmlns:c="http://schemas.openxmlformats.org/drawingml/2006/chart" xmlns:dgm="http://schemas.openxmlformats.org/drawingml/2006/diagram" xmlns:o="urn:schemas-microsoft-com:office:office" xmlns:v="urn:schemas-microsoft-com:vml" xmlns:pvml="urn:schemas-microsoft-com:office:powerpoint" xmlns:com="http://schemas.openxmlformats.org/drawingml/2006/compatibility" xmlns:p14="http://schemas.microsoft.com/office/powerpoint/2010/main" xmlns:p15="http://schemas.microsoft.com/office/powerpoint/2012/main" xmlns:ahyp="http://schemas.microsoft.com/office/drawing/2018/hyperlinkcolor">
+  <p:cSld>
+    <p:spTree>
+      <p:nvGrpSpPr>
+        <p:cNvPr id="388" name="Shape 388"/>
+        <p:cNvGrpSpPr/>
+        <p:nvPr/>
+      </p:nvGrpSpPr>
+      <p:grpSpPr>
+        <a:xfrm>
+          <a:off x="0" y="0"/>
+          <a:ext cx="0" cy="0"/>
+          <a:chOff x="0" y="0"/>
+          <a:chExt cx="0" cy="0"/>
+        </a:xfrm>
+      </p:grpSpPr>
+      <p:sp>
+        <p:nvSpPr>
+          <p:cNvPr id="389" name="Google Shape;389;p58"/>
           <p:cNvSpPr txBox="1"/>
           <p:nvPr>
             <p:ph type="title"/>
@@ -29278,7 +29652,7 @@
       </p:sp>
       <p:sp>
         <p:nvSpPr>
-          <p:cNvPr id="382" name="Google Shape;382;p57"/>
+          <p:cNvPr id="390" name="Google Shape;390;p58"/>
           <p:cNvSpPr txBox="1"/>
           <p:nvPr>
             <p:ph idx="12" type="sldNum"/>
@@ -29351,7 +29725,7 @@
       </p:sp>
       <p:sp>
         <p:nvSpPr>
-          <p:cNvPr id="383" name="Google Shape;383;p57"/>
+          <p:cNvPr id="391" name="Google Shape;391;p58"/>
           <p:cNvSpPr txBox="1"/>
           <p:nvPr>
             <p:ph idx="1" type="body"/>

</xml_diff>